<commit_message>
Update NET 6 Clean Architecture.pptx
</commit_message>
<xml_diff>
--- a/Slides/NET 6 Clean Architecture.pptx
+++ b/Slides/NET 6 Clean Architecture.pptx
@@ -21,6 +21,7 @@
     <p:sldId id="269" r:id="rId15"/>
     <p:sldId id="270" r:id="rId16"/>
     <p:sldId id="271" r:id="rId17"/>
+    <p:sldId id="272" r:id="rId18"/>
   </p:sldIdLst>
   <p:sldSz cx="12192000" cy="6858000"/>
   <p:notesSz cx="6858000" cy="9144000"/>
@@ -462,7 +463,7 @@
           <a:p>
             <a:fld id="{4852023B-35B4-406B-9C51-63D33C4B20A9}" type="datetimeFigureOut">
               <a:rPr lang="en-US" smtClean="0"/>
-              <a:t>4/5/2025</a:t>
+              <a:t>4/18/2025</a:t>
             </a:fld>
             <a:endParaRPr lang="en-US"/>
           </a:p>
@@ -1550,7 +1551,7 @@
           <a:p>
             <a:fld id="{4852023B-35B4-406B-9C51-63D33C4B20A9}" type="datetimeFigureOut">
               <a:rPr lang="en-US" smtClean="0"/>
-              <a:t>4/5/2025</a:t>
+              <a:t>4/18/2025</a:t>
             </a:fld>
             <a:endParaRPr lang="en-US"/>
           </a:p>
@@ -2530,7 +2531,7 @@
           <a:p>
             <a:fld id="{4852023B-35B4-406B-9C51-63D33C4B20A9}" type="datetimeFigureOut">
               <a:rPr lang="en-US" smtClean="0"/>
-              <a:t>4/5/2025</a:t>
+              <a:t>4/18/2025</a:t>
             </a:fld>
             <a:endParaRPr lang="en-US"/>
           </a:p>
@@ -3664,7 +3665,7 @@
           <a:p>
             <a:fld id="{4852023B-35B4-406B-9C51-63D33C4B20A9}" type="datetimeFigureOut">
               <a:rPr lang="en-US" smtClean="0"/>
-              <a:t>4/5/2025</a:t>
+              <a:t>4/18/2025</a:t>
             </a:fld>
             <a:endParaRPr lang="en-US"/>
           </a:p>
@@ -4697,7 +4698,7 @@
           <a:p>
             <a:fld id="{4852023B-35B4-406B-9C51-63D33C4B20A9}" type="datetimeFigureOut">
               <a:rPr lang="en-US" smtClean="0"/>
-              <a:t>4/5/2025</a:t>
+              <a:t>4/18/2025</a:t>
             </a:fld>
             <a:endParaRPr lang="en-US"/>
           </a:p>
@@ -5357,7 +5358,7 @@
           <a:p>
             <a:fld id="{4852023B-35B4-406B-9C51-63D33C4B20A9}" type="datetimeFigureOut">
               <a:rPr lang="en-US" smtClean="0"/>
-              <a:t>4/5/2025</a:t>
+              <a:t>4/18/2025</a:t>
             </a:fld>
             <a:endParaRPr lang="en-US"/>
           </a:p>
@@ -6218,7 +6219,7 @@
           <a:p>
             <a:fld id="{4852023B-35B4-406B-9C51-63D33C4B20A9}" type="datetimeFigureOut">
               <a:rPr lang="en-US" smtClean="0"/>
-              <a:t>4/5/2025</a:t>
+              <a:t>4/18/2025</a:t>
             </a:fld>
             <a:endParaRPr lang="en-US"/>
           </a:p>
@@ -6408,7 +6409,7 @@
           <a:p>
             <a:fld id="{4852023B-35B4-406B-9C51-63D33C4B20A9}" type="datetimeFigureOut">
               <a:rPr lang="en-US" smtClean="0"/>
-              <a:t>4/5/2025</a:t>
+              <a:t>4/18/2025</a:t>
             </a:fld>
             <a:endParaRPr lang="en-US"/>
           </a:p>
@@ -7380,7 +7381,7 @@
           <a:p>
             <a:fld id="{4852023B-35B4-406B-9C51-63D33C4B20A9}" type="datetimeFigureOut">
               <a:rPr lang="en-US" smtClean="0"/>
-              <a:t>4/5/2025</a:t>
+              <a:t>4/18/2025</a:t>
             </a:fld>
             <a:endParaRPr lang="en-US"/>
           </a:p>
@@ -7591,7 +7592,7 @@
           <a:p>
             <a:fld id="{4852023B-35B4-406B-9C51-63D33C4B20A9}" type="datetimeFigureOut">
               <a:rPr lang="en-US" smtClean="0"/>
-              <a:t>4/5/2025</a:t>
+              <a:t>4/18/2025</a:t>
             </a:fld>
             <a:endParaRPr lang="en-US"/>
           </a:p>
@@ -8625,7 +8626,7 @@
           <a:p>
             <a:fld id="{4852023B-35B4-406B-9C51-63D33C4B20A9}" type="datetimeFigureOut">
               <a:rPr lang="en-US" smtClean="0"/>
-              <a:t>4/5/2025</a:t>
+              <a:t>4/18/2025</a:t>
             </a:fld>
             <a:endParaRPr lang="en-US"/>
           </a:p>
@@ -8897,7 +8898,7 @@
           <a:p>
             <a:fld id="{4852023B-35B4-406B-9C51-63D33C4B20A9}" type="datetimeFigureOut">
               <a:rPr lang="en-US" smtClean="0"/>
-              <a:t>4/5/2025</a:t>
+              <a:t>4/18/2025</a:t>
             </a:fld>
             <a:endParaRPr lang="en-US"/>
           </a:p>
@@ -9307,7 +9308,7 @@
           <a:p>
             <a:fld id="{4852023B-35B4-406B-9C51-63D33C4B20A9}" type="datetimeFigureOut">
               <a:rPr lang="en-US" smtClean="0"/>
-              <a:t>4/5/2025</a:t>
+              <a:t>4/18/2025</a:t>
             </a:fld>
             <a:endParaRPr lang="en-US"/>
           </a:p>
@@ -9434,7 +9435,7 @@
           <a:p>
             <a:fld id="{4852023B-35B4-406B-9C51-63D33C4B20A9}" type="datetimeFigureOut">
               <a:rPr lang="en-US" smtClean="0"/>
-              <a:t>4/5/2025</a:t>
+              <a:t>4/18/2025</a:t>
             </a:fld>
             <a:endParaRPr lang="en-US"/>
           </a:p>
@@ -9529,7 +9530,7 @@
           <a:p>
             <a:fld id="{4852023B-35B4-406B-9C51-63D33C4B20A9}" type="datetimeFigureOut">
               <a:rPr lang="en-US" smtClean="0"/>
-              <a:t>4/5/2025</a:t>
+              <a:t>4/18/2025</a:t>
             </a:fld>
             <a:endParaRPr lang="en-US"/>
           </a:p>
@@ -10610,7 +10611,7 @@
           <a:p>
             <a:fld id="{4852023B-35B4-406B-9C51-63D33C4B20A9}" type="datetimeFigureOut">
               <a:rPr lang="en-US" smtClean="0"/>
-              <a:t>4/5/2025</a:t>
+              <a:t>4/18/2025</a:t>
             </a:fld>
             <a:endParaRPr lang="en-US"/>
           </a:p>
@@ -11718,7 +11719,7 @@
           <a:p>
             <a:fld id="{4852023B-35B4-406B-9C51-63D33C4B20A9}" type="datetimeFigureOut">
               <a:rPr lang="en-US" smtClean="0"/>
-              <a:t>4/5/2025</a:t>
+              <a:t>4/18/2025</a:t>
             </a:fld>
             <a:endParaRPr lang="en-US"/>
           </a:p>
@@ -12715,7 +12716,7 @@
           <a:p>
             <a:fld id="{4852023B-35B4-406B-9C51-63D33C4B20A9}" type="datetimeFigureOut">
               <a:rPr lang="en-US" smtClean="0"/>
-              <a:t>4/5/2025</a:t>
+              <a:t>4/18/2025</a:t>
             </a:fld>
             <a:endParaRPr lang="en-US"/>
           </a:p>
@@ -13279,7 +13280,7 @@
           <p:cNvPr id="9" name="TextBox 8">
             <a:extLst>
               <a:ext uri="{FF2B5EF4-FFF2-40B4-BE49-F238E27FC236}">
-                <a16:creationId xmlns="" xmlns:a16="http://schemas.microsoft.com/office/drawing/2014/main" id="{39BB7DC7-8A14-75D0-DB09-D55D93EBFBF9}"/>
+                <a16:creationId xmlns:a16="http://schemas.microsoft.com/office/drawing/2014/main" xmlns="" id="{39BB7DC7-8A14-75D0-DB09-D55D93EBFBF9}"/>
               </a:ext>
             </a:extLst>
           </p:cNvPr>
@@ -13311,7 +13312,7 @@
           <p:cNvPr id="12" name="Title 1">
             <a:extLst>
               <a:ext uri="{FF2B5EF4-FFF2-40B4-BE49-F238E27FC236}">
-                <a16:creationId xmlns="" xmlns:a16="http://schemas.microsoft.com/office/drawing/2014/main" id="{6BC09C08-DB38-0216-C707-8BA1E2DE56E4}"/>
+                <a16:creationId xmlns:a16="http://schemas.microsoft.com/office/drawing/2014/main" xmlns="" id="{6BC09C08-DB38-0216-C707-8BA1E2DE56E4}"/>
               </a:ext>
             </a:extLst>
           </p:cNvPr>
@@ -13344,7 +13345,7 @@
           <p:cNvPr id="2" name="TextBox 1">
             <a:extLst>
               <a:ext uri="{FF2B5EF4-FFF2-40B4-BE49-F238E27FC236}">
-                <a16:creationId xmlns="" xmlns:a16="http://schemas.microsoft.com/office/drawing/2014/main" id="{5BE8E56B-D104-CC08-48F4-D487AF749C7B}"/>
+                <a16:creationId xmlns:a16="http://schemas.microsoft.com/office/drawing/2014/main" xmlns="" id="{5BE8E56B-D104-CC08-48F4-D487AF749C7B}"/>
               </a:ext>
             </a:extLst>
           </p:cNvPr>
@@ -13447,7 +13448,7 @@
           <p:cNvPr id="3" name="TextBox 2">
             <a:extLst>
               <a:ext uri="{FF2B5EF4-FFF2-40B4-BE49-F238E27FC236}">
-                <a16:creationId xmlns="" xmlns:a16="http://schemas.microsoft.com/office/drawing/2014/main" id="{C8D9D74B-ED7B-F70B-3A5B-5356FA257D36}"/>
+                <a16:creationId xmlns:a16="http://schemas.microsoft.com/office/drawing/2014/main" xmlns="" id="{C8D9D74B-ED7B-F70B-3A5B-5356FA257D36}"/>
               </a:ext>
             </a:extLst>
           </p:cNvPr>
@@ -13539,7 +13540,7 @@
           <p:cNvPr id="7" name="Picture 6">
             <a:extLst>
               <a:ext uri="{FF2B5EF4-FFF2-40B4-BE49-F238E27FC236}">
-                <a16:creationId xmlns="" xmlns:a16="http://schemas.microsoft.com/office/drawing/2014/main" id="{85923558-9D5B-B7D9-795E-A80B0F560AC1}"/>
+                <a16:creationId xmlns:a16="http://schemas.microsoft.com/office/drawing/2014/main" xmlns="" id="{85923558-9D5B-B7D9-795E-A80B0F560AC1}"/>
               </a:ext>
             </a:extLst>
           </p:cNvPr>
@@ -13569,7 +13570,7 @@
           <p:cNvPr id="8" name="TextBox 7">
             <a:extLst>
               <a:ext uri="{FF2B5EF4-FFF2-40B4-BE49-F238E27FC236}">
-                <a16:creationId xmlns="" xmlns:a16="http://schemas.microsoft.com/office/drawing/2014/main" id="{5B300213-A76B-1DF1-2F8D-7B7E5749DD9D}"/>
+                <a16:creationId xmlns:a16="http://schemas.microsoft.com/office/drawing/2014/main" xmlns="" id="{5B300213-A76B-1DF1-2F8D-7B7E5749DD9D}"/>
               </a:ext>
             </a:extLst>
           </p:cNvPr>
@@ -14052,7 +14053,7 @@
           <p:cNvPr id="4" name="Title 1">
             <a:extLst>
               <a:ext uri="{FF2B5EF4-FFF2-40B4-BE49-F238E27FC236}">
-                <a16:creationId xmlns="" xmlns:a16="http://schemas.microsoft.com/office/drawing/2014/main" id="{0A4045B0-C940-93C6-79DB-351A147113E4}"/>
+                <a16:creationId xmlns:a16="http://schemas.microsoft.com/office/drawing/2014/main" xmlns="" id="{0A4045B0-C940-93C6-79DB-351A147113E4}"/>
               </a:ext>
             </a:extLst>
           </p:cNvPr>
@@ -14085,7 +14086,7 @@
           <p:cNvPr id="7" name="TextBox 6">
             <a:extLst>
               <a:ext uri="{FF2B5EF4-FFF2-40B4-BE49-F238E27FC236}">
-                <a16:creationId xmlns="" xmlns:a16="http://schemas.microsoft.com/office/drawing/2014/main" id="{1F77591A-DB2F-9F91-4945-B2EC29845B38}"/>
+                <a16:creationId xmlns:a16="http://schemas.microsoft.com/office/drawing/2014/main" xmlns="" id="{1F77591A-DB2F-9F91-4945-B2EC29845B38}"/>
               </a:ext>
             </a:extLst>
           </p:cNvPr>
@@ -14149,7 +14150,7 @@
           <p:cNvPr id="3" name="TextBox 2">
             <a:extLst>
               <a:ext uri="{FF2B5EF4-FFF2-40B4-BE49-F238E27FC236}">
-                <a16:creationId xmlns="" xmlns:a16="http://schemas.microsoft.com/office/drawing/2014/main" id="{75CE1D91-0A05-A797-DFCC-8AC0D954B8C4}"/>
+                <a16:creationId xmlns:a16="http://schemas.microsoft.com/office/drawing/2014/main" xmlns="" id="{75CE1D91-0A05-A797-DFCC-8AC0D954B8C4}"/>
               </a:ext>
             </a:extLst>
           </p:cNvPr>
@@ -14228,7 +14229,7 @@
           <p:cNvPr id="5" name="TextBox 4">
             <a:extLst>
               <a:ext uri="{FF2B5EF4-FFF2-40B4-BE49-F238E27FC236}">
-                <a16:creationId xmlns="" xmlns:a16="http://schemas.microsoft.com/office/drawing/2014/main" id="{D3A024AE-BC83-07F5-3885-BC864E91208B}"/>
+                <a16:creationId xmlns:a16="http://schemas.microsoft.com/office/drawing/2014/main" xmlns="" id="{D3A024AE-BC83-07F5-3885-BC864E91208B}"/>
               </a:ext>
             </a:extLst>
           </p:cNvPr>
@@ -14275,7 +14276,7 @@
           <p:cNvPr id="14" name="Picture 13">
             <a:extLst>
               <a:ext uri="{FF2B5EF4-FFF2-40B4-BE49-F238E27FC236}">
-                <a16:creationId xmlns="" xmlns:a16="http://schemas.microsoft.com/office/drawing/2014/main" id="{21282115-67E0-FC53-E5ED-24264FAF013C}"/>
+                <a16:creationId xmlns:a16="http://schemas.microsoft.com/office/drawing/2014/main" xmlns="" id="{21282115-67E0-FC53-E5ED-24264FAF013C}"/>
               </a:ext>
             </a:extLst>
           </p:cNvPr>
@@ -14659,7 +14660,7 @@
           <p:cNvPr id="4" name="Title 1">
             <a:extLst>
               <a:ext uri="{FF2B5EF4-FFF2-40B4-BE49-F238E27FC236}">
-                <a16:creationId xmlns="" xmlns:a16="http://schemas.microsoft.com/office/drawing/2014/main" id="{0A4045B0-C940-93C6-79DB-351A147113E4}"/>
+                <a16:creationId xmlns:a16="http://schemas.microsoft.com/office/drawing/2014/main" xmlns="" id="{0A4045B0-C940-93C6-79DB-351A147113E4}"/>
               </a:ext>
             </a:extLst>
           </p:cNvPr>
@@ -14692,7 +14693,7 @@
           <p:cNvPr id="7" name="TextBox 6">
             <a:extLst>
               <a:ext uri="{FF2B5EF4-FFF2-40B4-BE49-F238E27FC236}">
-                <a16:creationId xmlns="" xmlns:a16="http://schemas.microsoft.com/office/drawing/2014/main" id="{1F77591A-DB2F-9F91-4945-B2EC29845B38}"/>
+                <a16:creationId xmlns:a16="http://schemas.microsoft.com/office/drawing/2014/main" xmlns="" id="{1F77591A-DB2F-9F91-4945-B2EC29845B38}"/>
               </a:ext>
             </a:extLst>
           </p:cNvPr>
@@ -14794,7 +14795,7 @@
           <p:cNvPr id="6" name="TextBox 5">
             <a:extLst>
               <a:ext uri="{FF2B5EF4-FFF2-40B4-BE49-F238E27FC236}">
-                <a16:creationId xmlns="" xmlns:a16="http://schemas.microsoft.com/office/drawing/2014/main" id="{9CA64FD6-BEA4-2353-8A07-33D717CADA3A}"/>
+                <a16:creationId xmlns:a16="http://schemas.microsoft.com/office/drawing/2014/main" xmlns="" id="{9CA64FD6-BEA4-2353-8A07-33D717CADA3A}"/>
               </a:ext>
             </a:extLst>
           </p:cNvPr>
@@ -14890,7 +14891,7 @@
           <p:cNvPr id="10" name="TextBox 9">
             <a:extLst>
               <a:ext uri="{FF2B5EF4-FFF2-40B4-BE49-F238E27FC236}">
-                <a16:creationId xmlns="" xmlns:a16="http://schemas.microsoft.com/office/drawing/2014/main" id="{C89914A2-3B6D-D077-104F-47737F2D1CC9}"/>
+                <a16:creationId xmlns:a16="http://schemas.microsoft.com/office/drawing/2014/main" xmlns="" id="{C89914A2-3B6D-D077-104F-47737F2D1CC9}"/>
               </a:ext>
             </a:extLst>
           </p:cNvPr>
@@ -15083,7 +15084,7 @@
           <p:cNvPr id="12" name="TextBox 11">
             <a:extLst>
               <a:ext uri="{FF2B5EF4-FFF2-40B4-BE49-F238E27FC236}">
-                <a16:creationId xmlns="" xmlns:a16="http://schemas.microsoft.com/office/drawing/2014/main" id="{12B26B99-AF94-9433-984F-83ACFDE565BB}"/>
+                <a16:creationId xmlns:a16="http://schemas.microsoft.com/office/drawing/2014/main" xmlns="" id="{12B26B99-AF94-9433-984F-83ACFDE565BB}"/>
               </a:ext>
             </a:extLst>
           </p:cNvPr>
@@ -15294,7 +15295,7 @@
           <p:cNvPr id="8" name="Picture 7">
             <a:extLst>
               <a:ext uri="{FF2B5EF4-FFF2-40B4-BE49-F238E27FC236}">
-                <a16:creationId xmlns="" xmlns:a16="http://schemas.microsoft.com/office/drawing/2014/main" id="{CC045C0D-B68C-E07A-C5D4-4E8FBA8837BB}"/>
+                <a16:creationId xmlns:a16="http://schemas.microsoft.com/office/drawing/2014/main" xmlns="" id="{CC045C0D-B68C-E07A-C5D4-4E8FBA8837BB}"/>
               </a:ext>
             </a:extLst>
           </p:cNvPr>
@@ -15786,7 +15787,7 @@
           <p:cNvPr id="4" name="Title 1">
             <a:extLst>
               <a:ext uri="{FF2B5EF4-FFF2-40B4-BE49-F238E27FC236}">
-                <a16:creationId xmlns="" xmlns:a16="http://schemas.microsoft.com/office/drawing/2014/main" id="{0A4045B0-C940-93C6-79DB-351A147113E4}"/>
+                <a16:creationId xmlns:a16="http://schemas.microsoft.com/office/drawing/2014/main" xmlns="" id="{0A4045B0-C940-93C6-79DB-351A147113E4}"/>
               </a:ext>
             </a:extLst>
           </p:cNvPr>
@@ -15823,7 +15824,7 @@
           <p:cNvPr id="7" name="TextBox 6">
             <a:extLst>
               <a:ext uri="{FF2B5EF4-FFF2-40B4-BE49-F238E27FC236}">
-                <a16:creationId xmlns="" xmlns:a16="http://schemas.microsoft.com/office/drawing/2014/main" id="{1F77591A-DB2F-9F91-4945-B2EC29845B38}"/>
+                <a16:creationId xmlns:a16="http://schemas.microsoft.com/office/drawing/2014/main" xmlns="" id="{1F77591A-DB2F-9F91-4945-B2EC29845B38}"/>
               </a:ext>
             </a:extLst>
           </p:cNvPr>
@@ -16008,7 +16009,7 @@
           <p:cNvPr id="6" name="TextBox 5">
             <a:extLst>
               <a:ext uri="{FF2B5EF4-FFF2-40B4-BE49-F238E27FC236}">
-                <a16:creationId xmlns="" xmlns:a16="http://schemas.microsoft.com/office/drawing/2014/main" id="{9CA64FD6-BEA4-2353-8A07-33D717CADA3A}"/>
+                <a16:creationId xmlns:a16="http://schemas.microsoft.com/office/drawing/2014/main" xmlns="" id="{9CA64FD6-BEA4-2353-8A07-33D717CADA3A}"/>
               </a:ext>
             </a:extLst>
           </p:cNvPr>
@@ -16090,7 +16091,7 @@
           <p:cNvPr id="2" name="TextBox 1">
             <a:extLst>
               <a:ext uri="{FF2B5EF4-FFF2-40B4-BE49-F238E27FC236}">
-                <a16:creationId xmlns="" xmlns:a16="http://schemas.microsoft.com/office/drawing/2014/main" id="{AA2BD717-B48B-3A0B-5C27-23A0C68D8B05}"/>
+                <a16:creationId xmlns:a16="http://schemas.microsoft.com/office/drawing/2014/main" xmlns="" id="{AA2BD717-B48B-3A0B-5C27-23A0C68D8B05}"/>
               </a:ext>
             </a:extLst>
           </p:cNvPr>
@@ -16255,7 +16256,7 @@
           <p:cNvPr id="9" name="Picture 8">
             <a:extLst>
               <a:ext uri="{FF2B5EF4-FFF2-40B4-BE49-F238E27FC236}">
-                <a16:creationId xmlns="" xmlns:a16="http://schemas.microsoft.com/office/drawing/2014/main" id="{A38831D7-BB3B-C1F8-17D3-97CD0AD42136}"/>
+                <a16:creationId xmlns:a16="http://schemas.microsoft.com/office/drawing/2014/main" xmlns="" id="{A38831D7-BB3B-C1F8-17D3-97CD0AD42136}"/>
               </a:ext>
             </a:extLst>
           </p:cNvPr>
@@ -16647,7 +16648,7 @@
           <p:cNvPr id="4" name="Title 1">
             <a:extLst>
               <a:ext uri="{FF2B5EF4-FFF2-40B4-BE49-F238E27FC236}">
-                <a16:creationId xmlns="" xmlns:a16="http://schemas.microsoft.com/office/drawing/2014/main" id="{0A4045B0-C940-93C6-79DB-351A147113E4}"/>
+                <a16:creationId xmlns:a16="http://schemas.microsoft.com/office/drawing/2014/main" xmlns="" id="{0A4045B0-C940-93C6-79DB-351A147113E4}"/>
               </a:ext>
             </a:extLst>
           </p:cNvPr>
@@ -16688,7 +16689,7 @@
           <p:cNvPr id="7" name="TextBox 6">
             <a:extLst>
               <a:ext uri="{FF2B5EF4-FFF2-40B4-BE49-F238E27FC236}">
-                <a16:creationId xmlns="" xmlns:a16="http://schemas.microsoft.com/office/drawing/2014/main" id="{1F77591A-DB2F-9F91-4945-B2EC29845B38}"/>
+                <a16:creationId xmlns:a16="http://schemas.microsoft.com/office/drawing/2014/main" xmlns="" id="{1F77591A-DB2F-9F91-4945-B2EC29845B38}"/>
               </a:ext>
             </a:extLst>
           </p:cNvPr>
@@ -16742,7 +16743,7 @@
           <p:cNvPr id="5" name="Picture 4">
             <a:extLst>
               <a:ext uri="{FF2B5EF4-FFF2-40B4-BE49-F238E27FC236}">
-                <a16:creationId xmlns="" xmlns:a16="http://schemas.microsoft.com/office/drawing/2014/main" id="{415966A0-7DD5-0960-C994-7A2F3B3FD0AC}"/>
+                <a16:creationId xmlns:a16="http://schemas.microsoft.com/office/drawing/2014/main" xmlns="" id="{415966A0-7DD5-0960-C994-7A2F3B3FD0AC}"/>
               </a:ext>
             </a:extLst>
           </p:cNvPr>
@@ -16934,7 +16935,7 @@
           <p:cNvPr id="4" name="Title 1">
             <a:extLst>
               <a:ext uri="{FF2B5EF4-FFF2-40B4-BE49-F238E27FC236}">
-                <a16:creationId xmlns="" xmlns:a16="http://schemas.microsoft.com/office/drawing/2014/main" id="{0A4045B0-C940-93C6-79DB-351A147113E4}"/>
+                <a16:creationId xmlns:a16="http://schemas.microsoft.com/office/drawing/2014/main" xmlns="" id="{0A4045B0-C940-93C6-79DB-351A147113E4}"/>
               </a:ext>
             </a:extLst>
           </p:cNvPr>
@@ -17268,7 +17269,7 @@
           <p:cNvPr id="4" name="Title 1">
             <a:extLst>
               <a:ext uri="{FF2B5EF4-FFF2-40B4-BE49-F238E27FC236}">
-                <a16:creationId xmlns="" xmlns:a16="http://schemas.microsoft.com/office/drawing/2014/main" id="{0A4045B0-C940-93C6-79DB-351A147113E4}"/>
+                <a16:creationId xmlns:a16="http://schemas.microsoft.com/office/drawing/2014/main" xmlns="" id="{0A4045B0-C940-93C6-79DB-351A147113E4}"/>
               </a:ext>
             </a:extLst>
           </p:cNvPr>
@@ -17302,7 +17303,7 @@
           <p:cNvPr id="7" name="TextBox 6">
             <a:extLst>
               <a:ext uri="{FF2B5EF4-FFF2-40B4-BE49-F238E27FC236}">
-                <a16:creationId xmlns="" xmlns:a16="http://schemas.microsoft.com/office/drawing/2014/main" id="{1F77591A-DB2F-9F91-4945-B2EC29845B38}"/>
+                <a16:creationId xmlns:a16="http://schemas.microsoft.com/office/drawing/2014/main" xmlns="" id="{1F77591A-DB2F-9F91-4945-B2EC29845B38}"/>
               </a:ext>
             </a:extLst>
           </p:cNvPr>
@@ -17851,7 +17852,7 @@
           <p:cNvPr id="4" name="Title 1">
             <a:extLst>
               <a:ext uri="{FF2B5EF4-FFF2-40B4-BE49-F238E27FC236}">
-                <a16:creationId xmlns="" xmlns:a16="http://schemas.microsoft.com/office/drawing/2014/main" id="{0A4045B0-C940-93C6-79DB-351A147113E4}"/>
+                <a16:creationId xmlns:a16="http://schemas.microsoft.com/office/drawing/2014/main" xmlns="" id="{0A4045B0-C940-93C6-79DB-351A147113E4}"/>
               </a:ext>
             </a:extLst>
           </p:cNvPr>
@@ -18282,6 +18283,244 @@
 </p:sld>
 </file>
 
+<file path=ppt/slides/slide17.xml><?xml version="1.0" encoding="utf-8"?>
+<p:sld xmlns:a="http://schemas.openxmlformats.org/drawingml/2006/main" xmlns:r="http://schemas.openxmlformats.org/officeDocument/2006/relationships" xmlns:p="http://schemas.openxmlformats.org/presentationml/2006/main">
+  <p:cSld>
+    <p:spTree>
+      <p:nvGrpSpPr>
+        <p:cNvPr id="1" name=""/>
+        <p:cNvGrpSpPr/>
+        <p:nvPr/>
+      </p:nvGrpSpPr>
+      <p:grpSpPr>
+        <a:xfrm>
+          <a:off x="0" y="0"/>
+          <a:ext cx="0" cy="0"/>
+          <a:chOff x="0" y="0"/>
+          <a:chExt cx="0" cy="0"/>
+        </a:xfrm>
+      </p:grpSpPr>
+      <p:sp>
+        <p:nvSpPr>
+          <p:cNvPr id="4" name="Title 1">
+            <a:extLst>
+              <a:ext uri="{FF2B5EF4-FFF2-40B4-BE49-F238E27FC236}">
+                <a16:creationId xmlns:a16="http://schemas.microsoft.com/office/drawing/2014/main" xmlns="" id="{0A4045B0-C940-93C6-79DB-351A147113E4}"/>
+              </a:ext>
+            </a:extLst>
+          </p:cNvPr>
+          <p:cNvSpPr>
+            <a:spLocks noGrp="1"/>
+          </p:cNvSpPr>
+          <p:nvPr>
+            <p:ph type="ctrTitle"/>
+          </p:nvPr>
+        </p:nvSpPr>
+        <p:spPr>
+          <a:xfrm>
+            <a:off x="670560" y="757645"/>
+            <a:ext cx="7968343" cy="5050971"/>
+          </a:xfrm>
+        </p:spPr>
+        <p:txBody>
+          <a:bodyPr/>
+          <a:lstStyle/>
+          <a:p>
+            <a:r>
+              <a:rPr lang="en-US" sz="6600" b="1" dirty="0" smtClean="0">
+                <a:solidFill>
+                  <a:srgbClr val="FFC000"/>
+                </a:solidFill>
+              </a:rPr>
+              <a:t>Resend Email</a:t>
+            </a:r>
+            <a:r>
+              <a:rPr lang="en-US" sz="6600" b="1" dirty="0" smtClean="0">
+                <a:solidFill>
+                  <a:schemeClr val="bg1">
+                    <a:lumMod val="95000"/>
+                  </a:schemeClr>
+                </a:solidFill>
+              </a:rPr>
+              <a:t> </a:t>
+            </a:r>
+            <a:r>
+              <a:rPr lang="en-US" sz="6600" b="1" dirty="0" smtClean="0">
+                <a:solidFill>
+                  <a:srgbClr val="FFC000"/>
+                </a:solidFill>
+              </a:rPr>
+              <a:t>Confirmation</a:t>
+            </a:r>
+            <a:r>
+              <a:rPr lang="en-US" sz="6600" b="1" dirty="0" smtClean="0">
+                <a:solidFill>
+                  <a:schemeClr val="bg1">
+                    <a:lumMod val="95000"/>
+                  </a:schemeClr>
+                </a:solidFill>
+              </a:rPr>
+              <a:t/>
+            </a:r>
+            <a:br>
+              <a:rPr lang="en-US" sz="6600" b="1" dirty="0" smtClean="0">
+                <a:solidFill>
+                  <a:schemeClr val="bg1">
+                    <a:lumMod val="95000"/>
+                  </a:schemeClr>
+                </a:solidFill>
+              </a:rPr>
+            </a:br>
+            <a:r>
+              <a:rPr lang="en-US" sz="6600" b="1" dirty="0" smtClean="0">
+                <a:solidFill>
+                  <a:schemeClr val="bg1">
+                    <a:lumMod val="95000"/>
+                  </a:schemeClr>
+                </a:solidFill>
+              </a:rPr>
+              <a:t>in </a:t>
+            </a:r>
+            <a:r>
+              <a:rPr lang="en-US" sz="6600" b="1" dirty="0" err="1" smtClean="0">
+                <a:solidFill>
+                  <a:schemeClr val="bg1">
+                    <a:lumMod val="95000"/>
+                  </a:schemeClr>
+                </a:solidFill>
+              </a:rPr>
+              <a:t>.Net</a:t>
+            </a:r>
+            <a:r>
+              <a:rPr lang="en-US" sz="6600" b="1" dirty="0" smtClean="0">
+                <a:solidFill>
+                  <a:schemeClr val="bg1">
+                    <a:lumMod val="95000"/>
+                  </a:schemeClr>
+                </a:solidFill>
+              </a:rPr>
+              <a:t> </a:t>
+            </a:r>
+            <a:r>
+              <a:rPr lang="en-US" sz="6600" b="1" dirty="0" smtClean="0">
+                <a:solidFill>
+                  <a:schemeClr val="bg1">
+                    <a:lumMod val="95000"/>
+                  </a:schemeClr>
+                </a:solidFill>
+              </a:rPr>
+              <a:t>Core </a:t>
+            </a:r>
+            <a:br>
+              <a:rPr lang="en-US" sz="6600" b="1" dirty="0" smtClean="0">
+                <a:solidFill>
+                  <a:schemeClr val="bg1">
+                    <a:lumMod val="95000"/>
+                  </a:schemeClr>
+                </a:solidFill>
+              </a:rPr>
+            </a:br>
+            <a:r>
+              <a:rPr lang="en-US" sz="6600" b="1" dirty="0" smtClean="0">
+                <a:solidFill>
+                  <a:srgbClr val="92D050"/>
+                </a:solidFill>
+              </a:rPr>
+              <a:t>Clean </a:t>
+            </a:r>
+            <a:r>
+              <a:rPr lang="en-US" sz="6600" b="1" dirty="0" smtClean="0">
+                <a:solidFill>
+                  <a:srgbClr val="92D050"/>
+                </a:solidFill>
+              </a:rPr>
+              <a:t>Architecture </a:t>
+            </a:r>
+            <a:r>
+              <a:rPr lang="en-US" sz="6600" b="1" dirty="0" smtClean="0">
+                <a:solidFill>
+                  <a:srgbClr val="92D050"/>
+                </a:solidFill>
+              </a:rPr>
+              <a:t/>
+            </a:r>
+            <a:br>
+              <a:rPr lang="en-US" sz="6600" b="1" dirty="0" smtClean="0">
+                <a:solidFill>
+                  <a:srgbClr val="92D050"/>
+                </a:solidFill>
+              </a:rPr>
+            </a:br>
+            <a:r>
+              <a:rPr lang="en-US" sz="6600" b="1" dirty="0" smtClean="0">
+                <a:solidFill>
+                  <a:schemeClr val="bg1">
+                    <a:lumMod val="95000"/>
+                  </a:schemeClr>
+                </a:solidFill>
+              </a:rPr>
+              <a:t>Part </a:t>
+            </a:r>
+            <a:r>
+              <a:rPr lang="en-US" sz="6600" b="1" dirty="0" smtClean="0">
+                <a:solidFill>
+                  <a:srgbClr val="FFFF00"/>
+                </a:solidFill>
+              </a:rPr>
+              <a:t>14</a:t>
+            </a:r>
+            <a:endParaRPr lang="en-US" sz="6600" b="1" dirty="0">
+              <a:solidFill>
+                <a:srgbClr val="FFFF00"/>
+              </a:solidFill>
+            </a:endParaRPr>
+          </a:p>
+        </p:txBody>
+      </p:sp>
+      <p:pic>
+        <p:nvPicPr>
+          <p:cNvPr id="3" name="Picture 2"/>
+          <p:cNvPicPr>
+            <a:picLocks noChangeAspect="1"/>
+          </p:cNvPicPr>
+          <p:nvPr/>
+        </p:nvPicPr>
+        <p:blipFill>
+          <a:blip r:embed="rId2"/>
+          <a:stretch>
+            <a:fillRect/>
+          </a:stretch>
+        </p:blipFill>
+        <p:spPr>
+          <a:xfrm>
+            <a:off x="8638903" y="1280158"/>
+            <a:ext cx="2969622" cy="4127865"/>
+          </a:xfrm>
+          <a:prstGeom prst="rect">
+            <a:avLst/>
+          </a:prstGeom>
+        </p:spPr>
+      </p:pic>
+    </p:spTree>
+    <p:extLst>
+      <p:ext uri="{BB962C8B-B14F-4D97-AF65-F5344CB8AC3E}">
+        <p14:creationId xmlns:p14="http://schemas.microsoft.com/office/powerpoint/2010/main" val="3432929825"/>
+      </p:ext>
+    </p:extLst>
+  </p:cSld>
+  <p:clrMapOvr>
+    <a:masterClrMapping/>
+  </p:clrMapOvr>
+  <p:timing>
+    <p:tnLst>
+      <p:par>
+        <p:cTn id="1" dur="indefinite" restart="never" nodeType="tmRoot"/>
+      </p:par>
+    </p:tnLst>
+  </p:timing>
+</p:sld>
+</file>
+
 <file path=ppt/slides/slide2.xml><?xml version="1.0" encoding="utf-8"?>
 <p:sld xmlns:a="http://schemas.openxmlformats.org/drawingml/2006/main" xmlns:r="http://schemas.openxmlformats.org/officeDocument/2006/relationships" xmlns:p="http://schemas.openxmlformats.org/presentationml/2006/main">
   <p:cSld>
@@ -18304,7 +18543,7 @@
           <p:cNvPr id="14" name="TextBox 13">
             <a:extLst>
               <a:ext uri="{FF2B5EF4-FFF2-40B4-BE49-F238E27FC236}">
-                <a16:creationId xmlns="" xmlns:a16="http://schemas.microsoft.com/office/drawing/2014/main" id="{2D6E2A5E-967C-56EE-C60B-33A0A449ADC0}"/>
+                <a16:creationId xmlns:a16="http://schemas.microsoft.com/office/drawing/2014/main" xmlns="" id="{2D6E2A5E-967C-56EE-C60B-33A0A449ADC0}"/>
               </a:ext>
             </a:extLst>
           </p:cNvPr>
@@ -18349,7 +18588,7 @@
           <p:cNvPr id="15" name="TextBox 14">
             <a:extLst>
               <a:ext uri="{FF2B5EF4-FFF2-40B4-BE49-F238E27FC236}">
-                <a16:creationId xmlns="" xmlns:a16="http://schemas.microsoft.com/office/drawing/2014/main" id="{3E986115-D58B-7571-A6A0-D672A63D6191}"/>
+                <a16:creationId xmlns:a16="http://schemas.microsoft.com/office/drawing/2014/main" xmlns="" id="{3E986115-D58B-7571-A6A0-D672A63D6191}"/>
               </a:ext>
             </a:extLst>
           </p:cNvPr>
@@ -18459,7 +18698,7 @@
           <p:cNvPr id="18" name="TextBox 17">
             <a:extLst>
               <a:ext uri="{FF2B5EF4-FFF2-40B4-BE49-F238E27FC236}">
-                <a16:creationId xmlns="" xmlns:a16="http://schemas.microsoft.com/office/drawing/2014/main" id="{66A86D0B-A6B0-D5E5-0596-7362FA59BAF6}"/>
+                <a16:creationId xmlns:a16="http://schemas.microsoft.com/office/drawing/2014/main" xmlns="" id="{66A86D0B-A6B0-D5E5-0596-7362FA59BAF6}"/>
               </a:ext>
             </a:extLst>
           </p:cNvPr>
@@ -18513,7 +18752,7 @@
           <p:cNvPr id="20" name="TextBox 19">
             <a:extLst>
               <a:ext uri="{FF2B5EF4-FFF2-40B4-BE49-F238E27FC236}">
-                <a16:creationId xmlns="" xmlns:a16="http://schemas.microsoft.com/office/drawing/2014/main" id="{0079DF3F-C0DE-642F-2ED9-10544F59D43B}"/>
+                <a16:creationId xmlns:a16="http://schemas.microsoft.com/office/drawing/2014/main" xmlns="" id="{0079DF3F-C0DE-642F-2ED9-10544F59D43B}"/>
               </a:ext>
             </a:extLst>
           </p:cNvPr>
@@ -18580,7 +18819,7 @@
           <p:cNvPr id="25" name="TextBox 24">
             <a:extLst>
               <a:ext uri="{FF2B5EF4-FFF2-40B4-BE49-F238E27FC236}">
-                <a16:creationId xmlns="" xmlns:a16="http://schemas.microsoft.com/office/drawing/2014/main" id="{198E47A3-C3A7-7CD4-200F-D6F44FE978FD}"/>
+                <a16:creationId xmlns:a16="http://schemas.microsoft.com/office/drawing/2014/main" xmlns="" id="{198E47A3-C3A7-7CD4-200F-D6F44FE978FD}"/>
               </a:ext>
             </a:extLst>
           </p:cNvPr>
@@ -19035,7 +19274,7 @@
           <p:cNvPr id="26" name="TextBox 25">
             <a:extLst>
               <a:ext uri="{FF2B5EF4-FFF2-40B4-BE49-F238E27FC236}">
-                <a16:creationId xmlns="" xmlns:a16="http://schemas.microsoft.com/office/drawing/2014/main" id="{37BEBCE1-74C6-5499-F88C-F8AE8BE63895}"/>
+                <a16:creationId xmlns:a16="http://schemas.microsoft.com/office/drawing/2014/main" xmlns="" id="{37BEBCE1-74C6-5499-F88C-F8AE8BE63895}"/>
               </a:ext>
             </a:extLst>
           </p:cNvPr>
@@ -19089,7 +19328,7 @@
           <p:cNvPr id="27" name="TextBox 26">
             <a:extLst>
               <a:ext uri="{FF2B5EF4-FFF2-40B4-BE49-F238E27FC236}">
-                <a16:creationId xmlns="" xmlns:a16="http://schemas.microsoft.com/office/drawing/2014/main" id="{828B7BCB-60B4-7021-116C-92B338033765}"/>
+                <a16:creationId xmlns:a16="http://schemas.microsoft.com/office/drawing/2014/main" xmlns="" id="{828B7BCB-60B4-7021-116C-92B338033765}"/>
               </a:ext>
             </a:extLst>
           </p:cNvPr>
@@ -19250,7 +19489,7 @@
           <p:cNvPr id="7" name="Title 1">
             <a:extLst>
               <a:ext uri="{FF2B5EF4-FFF2-40B4-BE49-F238E27FC236}">
-                <a16:creationId xmlns="" xmlns:a16="http://schemas.microsoft.com/office/drawing/2014/main" id="{0CE071D6-AF8F-9C57-F47E-6B74823ED513}"/>
+                <a16:creationId xmlns:a16="http://schemas.microsoft.com/office/drawing/2014/main" xmlns="" id="{0CE071D6-AF8F-9C57-F47E-6B74823ED513}"/>
               </a:ext>
             </a:extLst>
           </p:cNvPr>
@@ -19897,7 +20136,7 @@
           <p:cNvPr id="5" name="TextBox 4">
             <a:extLst>
               <a:ext uri="{FF2B5EF4-FFF2-40B4-BE49-F238E27FC236}">
-                <a16:creationId xmlns="" xmlns:a16="http://schemas.microsoft.com/office/drawing/2014/main" id="{FD94C650-D2EC-5A80-D053-15314A15912E}"/>
+                <a16:creationId xmlns:a16="http://schemas.microsoft.com/office/drawing/2014/main" xmlns="" id="{FD94C650-D2EC-5A80-D053-15314A15912E}"/>
               </a:ext>
             </a:extLst>
           </p:cNvPr>
@@ -20030,7 +20269,7 @@
           <p:cNvPr id="6" name="Title 1">
             <a:extLst>
               <a:ext uri="{FF2B5EF4-FFF2-40B4-BE49-F238E27FC236}">
-                <a16:creationId xmlns="" xmlns:a16="http://schemas.microsoft.com/office/drawing/2014/main" id="{C8AD9B0B-5832-FBE1-7CAF-B5DC8714288E}"/>
+                <a16:creationId xmlns:a16="http://schemas.microsoft.com/office/drawing/2014/main" xmlns="" id="{C8AD9B0B-5832-FBE1-7CAF-B5DC8714288E}"/>
               </a:ext>
             </a:extLst>
           </p:cNvPr>
@@ -20063,7 +20302,7 @@
           <p:cNvPr id="8" name="TextBox 7">
             <a:extLst>
               <a:ext uri="{FF2B5EF4-FFF2-40B4-BE49-F238E27FC236}">
-                <a16:creationId xmlns="" xmlns:a16="http://schemas.microsoft.com/office/drawing/2014/main" id="{05C97F0F-A9E3-7357-C0E8-A15545E41298}"/>
+                <a16:creationId xmlns:a16="http://schemas.microsoft.com/office/drawing/2014/main" xmlns="" id="{05C97F0F-A9E3-7357-C0E8-A15545E41298}"/>
               </a:ext>
             </a:extLst>
           </p:cNvPr>
@@ -20209,7 +20448,7 @@
           <p:cNvPr id="2" name="TextBox 1">
             <a:extLst>
               <a:ext uri="{FF2B5EF4-FFF2-40B4-BE49-F238E27FC236}">
-                <a16:creationId xmlns="" xmlns:a16="http://schemas.microsoft.com/office/drawing/2014/main" id="{FAFC4B0A-4EC1-C95B-BF8E-F2E4C60860C7}"/>
+                <a16:creationId xmlns:a16="http://schemas.microsoft.com/office/drawing/2014/main" xmlns="" id="{FAFC4B0A-4EC1-C95B-BF8E-F2E4C60860C7}"/>
               </a:ext>
             </a:extLst>
           </p:cNvPr>
@@ -20668,7 +20907,7 @@
           <p:cNvPr id="4" name="Title 1">
             <a:extLst>
               <a:ext uri="{FF2B5EF4-FFF2-40B4-BE49-F238E27FC236}">
-                <a16:creationId xmlns="" xmlns:a16="http://schemas.microsoft.com/office/drawing/2014/main" id="{0A4045B0-C940-93C6-79DB-351A147113E4}"/>
+                <a16:creationId xmlns:a16="http://schemas.microsoft.com/office/drawing/2014/main" xmlns="" id="{0A4045B0-C940-93C6-79DB-351A147113E4}"/>
               </a:ext>
             </a:extLst>
           </p:cNvPr>
@@ -20701,7 +20940,7 @@
           <p:cNvPr id="5" name="TextBox 4">
             <a:extLst>
               <a:ext uri="{FF2B5EF4-FFF2-40B4-BE49-F238E27FC236}">
-                <a16:creationId xmlns="" xmlns:a16="http://schemas.microsoft.com/office/drawing/2014/main" id="{68ED6C88-4D30-47B1-98F2-10B61639E784}"/>
+                <a16:creationId xmlns:a16="http://schemas.microsoft.com/office/drawing/2014/main" xmlns="" id="{68ED6C88-4D30-47B1-98F2-10B61639E784}"/>
               </a:ext>
             </a:extLst>
           </p:cNvPr>
@@ -20743,7 +20982,7 @@
           <p:cNvPr id="6" name="TextBox 5">
             <a:extLst>
               <a:ext uri="{FF2B5EF4-FFF2-40B4-BE49-F238E27FC236}">
-                <a16:creationId xmlns="" xmlns:a16="http://schemas.microsoft.com/office/drawing/2014/main" id="{DF3DBA21-50B3-332B-D2D0-1673209B9496}"/>
+                <a16:creationId xmlns:a16="http://schemas.microsoft.com/office/drawing/2014/main" xmlns="" id="{DF3DBA21-50B3-332B-D2D0-1673209B9496}"/>
               </a:ext>
             </a:extLst>
           </p:cNvPr>
@@ -20785,7 +21024,7 @@
           <p:cNvPr id="10" name="TextBox 9">
             <a:extLst>
               <a:ext uri="{FF2B5EF4-FFF2-40B4-BE49-F238E27FC236}">
-                <a16:creationId xmlns="" xmlns:a16="http://schemas.microsoft.com/office/drawing/2014/main" id="{95C399D3-9FFE-F9D2-8DD0-04F8296DD6C5}"/>
+                <a16:creationId xmlns:a16="http://schemas.microsoft.com/office/drawing/2014/main" xmlns="" id="{95C399D3-9FFE-F9D2-8DD0-04F8296DD6C5}"/>
               </a:ext>
             </a:extLst>
           </p:cNvPr>
@@ -20827,7 +21066,7 @@
           <p:cNvPr id="12" name="Picture 11">
             <a:extLst>
               <a:ext uri="{FF2B5EF4-FFF2-40B4-BE49-F238E27FC236}">
-                <a16:creationId xmlns="" xmlns:a16="http://schemas.microsoft.com/office/drawing/2014/main" id="{6F0558F7-9155-B500-7EB5-FE4B29AFAC65}"/>
+                <a16:creationId xmlns:a16="http://schemas.microsoft.com/office/drawing/2014/main" xmlns="" id="{6F0558F7-9155-B500-7EB5-FE4B29AFAC65}"/>
               </a:ext>
             </a:extLst>
           </p:cNvPr>
@@ -21219,7 +21458,7 @@
           <p:cNvPr id="4" name="Title 1">
             <a:extLst>
               <a:ext uri="{FF2B5EF4-FFF2-40B4-BE49-F238E27FC236}">
-                <a16:creationId xmlns="" xmlns:a16="http://schemas.microsoft.com/office/drawing/2014/main" id="{0A4045B0-C940-93C6-79DB-351A147113E4}"/>
+                <a16:creationId xmlns:a16="http://schemas.microsoft.com/office/drawing/2014/main" xmlns="" id="{0A4045B0-C940-93C6-79DB-351A147113E4}"/>
               </a:ext>
             </a:extLst>
           </p:cNvPr>
@@ -21252,7 +21491,7 @@
           <p:cNvPr id="5" name="TextBox 4">
             <a:extLst>
               <a:ext uri="{FF2B5EF4-FFF2-40B4-BE49-F238E27FC236}">
-                <a16:creationId xmlns="" xmlns:a16="http://schemas.microsoft.com/office/drawing/2014/main" id="{68ED6C88-4D30-47B1-98F2-10B61639E784}"/>
+                <a16:creationId xmlns:a16="http://schemas.microsoft.com/office/drawing/2014/main" xmlns="" id="{68ED6C88-4D30-47B1-98F2-10B61639E784}"/>
               </a:ext>
             </a:extLst>
           </p:cNvPr>
@@ -21294,7 +21533,7 @@
           <p:cNvPr id="16" name="TextBox 15">
             <a:extLst>
               <a:ext uri="{FF2B5EF4-FFF2-40B4-BE49-F238E27FC236}">
-                <a16:creationId xmlns="" xmlns:a16="http://schemas.microsoft.com/office/drawing/2014/main" id="{34FEC4EB-6265-3C9A-194F-C9E41AAAC52C}"/>
+                <a16:creationId xmlns:a16="http://schemas.microsoft.com/office/drawing/2014/main" xmlns="" id="{34FEC4EB-6265-3C9A-194F-C9E41AAAC52C}"/>
               </a:ext>
             </a:extLst>
           </p:cNvPr>
@@ -21340,7 +21579,7 @@
           <p:cNvPr id="17" name="TextBox 16">
             <a:extLst>
               <a:ext uri="{FF2B5EF4-FFF2-40B4-BE49-F238E27FC236}">
-                <a16:creationId xmlns="" xmlns:a16="http://schemas.microsoft.com/office/drawing/2014/main" id="{21C37205-2E9B-A3D7-453C-BA1143389C47}"/>
+                <a16:creationId xmlns:a16="http://schemas.microsoft.com/office/drawing/2014/main" xmlns="" id="{21C37205-2E9B-A3D7-453C-BA1143389C47}"/>
               </a:ext>
             </a:extLst>
           </p:cNvPr>
@@ -21379,7 +21618,7 @@
           <p:cNvPr id="18" name="TextBox 17">
             <a:extLst>
               <a:ext uri="{FF2B5EF4-FFF2-40B4-BE49-F238E27FC236}">
-                <a16:creationId xmlns="" xmlns:a16="http://schemas.microsoft.com/office/drawing/2014/main" id="{C11EB94A-7599-12BE-A015-138DF82E7D88}"/>
+                <a16:creationId xmlns:a16="http://schemas.microsoft.com/office/drawing/2014/main" xmlns="" id="{C11EB94A-7599-12BE-A015-138DF82E7D88}"/>
               </a:ext>
             </a:extLst>
           </p:cNvPr>
@@ -21421,7 +21660,7 @@
           <p:cNvPr id="9" name="Picture 8">
             <a:extLst>
               <a:ext uri="{FF2B5EF4-FFF2-40B4-BE49-F238E27FC236}">
-                <a16:creationId xmlns="" xmlns:a16="http://schemas.microsoft.com/office/drawing/2014/main" id="{F3934AA7-7FA1-4AF5-11DF-34C8209BBBC5}"/>
+                <a16:creationId xmlns:a16="http://schemas.microsoft.com/office/drawing/2014/main" xmlns="" id="{F3934AA7-7FA1-4AF5-11DF-34C8209BBBC5}"/>
               </a:ext>
             </a:extLst>
           </p:cNvPr>
@@ -21919,7 +22158,7 @@
           <p:cNvPr id="4" name="Title 1">
             <a:extLst>
               <a:ext uri="{FF2B5EF4-FFF2-40B4-BE49-F238E27FC236}">
-                <a16:creationId xmlns="" xmlns:a16="http://schemas.microsoft.com/office/drawing/2014/main" id="{0A4045B0-C940-93C6-79DB-351A147113E4}"/>
+                <a16:creationId xmlns:a16="http://schemas.microsoft.com/office/drawing/2014/main" xmlns="" id="{0A4045B0-C940-93C6-79DB-351A147113E4}"/>
               </a:ext>
             </a:extLst>
           </p:cNvPr>
@@ -21952,7 +22191,7 @@
           <p:cNvPr id="5" name="TextBox 4">
             <a:extLst>
               <a:ext uri="{FF2B5EF4-FFF2-40B4-BE49-F238E27FC236}">
-                <a16:creationId xmlns="" xmlns:a16="http://schemas.microsoft.com/office/drawing/2014/main" id="{AAC62DE3-37FA-81ED-2B19-6155C5C4FB6A}"/>
+                <a16:creationId xmlns:a16="http://schemas.microsoft.com/office/drawing/2014/main" xmlns="" id="{AAC62DE3-37FA-81ED-2B19-6155C5C4FB6A}"/>
               </a:ext>
             </a:extLst>
           </p:cNvPr>
@@ -22316,7 +22555,7 @@
           <p:cNvPr id="9" name="Picture 8">
             <a:extLst>
               <a:ext uri="{FF2B5EF4-FFF2-40B4-BE49-F238E27FC236}">
-                <a16:creationId xmlns="" xmlns:a16="http://schemas.microsoft.com/office/drawing/2014/main" id="{DC69AF7A-D5F6-AF94-6226-64A1B3D13F3D}"/>
+                <a16:creationId xmlns:a16="http://schemas.microsoft.com/office/drawing/2014/main" xmlns="" id="{DC69AF7A-D5F6-AF94-6226-64A1B3D13F3D}"/>
               </a:ext>
             </a:extLst>
           </p:cNvPr>
@@ -22508,7 +22747,7 @@
           <p:cNvPr id="4" name="Title 1">
             <a:extLst>
               <a:ext uri="{FF2B5EF4-FFF2-40B4-BE49-F238E27FC236}">
-                <a16:creationId xmlns="" xmlns:a16="http://schemas.microsoft.com/office/drawing/2014/main" id="{0A4045B0-C940-93C6-79DB-351A147113E4}"/>
+                <a16:creationId xmlns:a16="http://schemas.microsoft.com/office/drawing/2014/main" xmlns="" id="{0A4045B0-C940-93C6-79DB-351A147113E4}"/>
               </a:ext>
             </a:extLst>
           </p:cNvPr>
@@ -22541,7 +22780,7 @@
           <p:cNvPr id="5" name="TextBox 4">
             <a:extLst>
               <a:ext uri="{FF2B5EF4-FFF2-40B4-BE49-F238E27FC236}">
-                <a16:creationId xmlns="" xmlns:a16="http://schemas.microsoft.com/office/drawing/2014/main" id="{AAC62DE3-37FA-81ED-2B19-6155C5C4FB6A}"/>
+                <a16:creationId xmlns:a16="http://schemas.microsoft.com/office/drawing/2014/main" xmlns="" id="{AAC62DE3-37FA-81ED-2B19-6155C5C4FB6A}"/>
               </a:ext>
             </a:extLst>
           </p:cNvPr>
@@ -22823,7 +23062,7 @@
           <p:cNvPr id="3" name="Picture 2">
             <a:extLst>
               <a:ext uri="{FF2B5EF4-FFF2-40B4-BE49-F238E27FC236}">
-                <a16:creationId xmlns="" xmlns:a16="http://schemas.microsoft.com/office/drawing/2014/main" id="{26D9E3AC-C35C-EBF0-20C7-EAD5FC9B88C7}"/>
+                <a16:creationId xmlns:a16="http://schemas.microsoft.com/office/drawing/2014/main" xmlns="" id="{26D9E3AC-C35C-EBF0-20C7-EAD5FC9B88C7}"/>
               </a:ext>
             </a:extLst>
           </p:cNvPr>
@@ -23015,7 +23254,7 @@
           <p:cNvPr id="4" name="Title 1">
             <a:extLst>
               <a:ext uri="{FF2B5EF4-FFF2-40B4-BE49-F238E27FC236}">
-                <a16:creationId xmlns="" xmlns:a16="http://schemas.microsoft.com/office/drawing/2014/main" id="{0A4045B0-C940-93C6-79DB-351A147113E4}"/>
+                <a16:creationId xmlns:a16="http://schemas.microsoft.com/office/drawing/2014/main" xmlns="" id="{0A4045B0-C940-93C6-79DB-351A147113E4}"/>
               </a:ext>
             </a:extLst>
           </p:cNvPr>
@@ -23052,7 +23291,7 @@
           <p:cNvPr id="5" name="TextBox 4">
             <a:extLst>
               <a:ext uri="{FF2B5EF4-FFF2-40B4-BE49-F238E27FC236}">
-                <a16:creationId xmlns="" xmlns:a16="http://schemas.microsoft.com/office/drawing/2014/main" id="{AAC62DE3-37FA-81ED-2B19-6155C5C4FB6A}"/>
+                <a16:creationId xmlns:a16="http://schemas.microsoft.com/office/drawing/2014/main" xmlns="" id="{AAC62DE3-37FA-81ED-2B19-6155C5C4FB6A}"/>
               </a:ext>
             </a:extLst>
           </p:cNvPr>
@@ -23315,7 +23554,7 @@
           <p:cNvPr id="6" name="Picture 5">
             <a:extLst>
               <a:ext uri="{FF2B5EF4-FFF2-40B4-BE49-F238E27FC236}">
-                <a16:creationId xmlns="" xmlns:a16="http://schemas.microsoft.com/office/drawing/2014/main" id="{7C88032A-86F2-5985-C0A4-6E39C9F51CC6}"/>
+                <a16:creationId xmlns:a16="http://schemas.microsoft.com/office/drawing/2014/main" xmlns="" id="{7C88032A-86F2-5985-C0A4-6E39C9F51CC6}"/>
               </a:ext>
             </a:extLst>
           </p:cNvPr>
@@ -23351,7 +23590,7 @@
           <p:cNvPr id="7" name="TextBox 6">
             <a:extLst>
               <a:ext uri="{FF2B5EF4-FFF2-40B4-BE49-F238E27FC236}">
-                <a16:creationId xmlns="" xmlns:a16="http://schemas.microsoft.com/office/drawing/2014/main" id="{1F77591A-DB2F-9F91-4945-B2EC29845B38}"/>
+                <a16:creationId xmlns:a16="http://schemas.microsoft.com/office/drawing/2014/main" xmlns="" id="{1F77591A-DB2F-9F91-4945-B2EC29845B38}"/>
               </a:ext>
             </a:extLst>
           </p:cNvPr>
@@ -23713,7 +23952,7 @@
           <p:cNvPr id="4" name="Title 1">
             <a:extLst>
               <a:ext uri="{FF2B5EF4-FFF2-40B4-BE49-F238E27FC236}">
-                <a16:creationId xmlns="" xmlns:a16="http://schemas.microsoft.com/office/drawing/2014/main" id="{0A4045B0-C940-93C6-79DB-351A147113E4}"/>
+                <a16:creationId xmlns:a16="http://schemas.microsoft.com/office/drawing/2014/main" xmlns="" id="{0A4045B0-C940-93C6-79DB-351A147113E4}"/>
               </a:ext>
             </a:extLst>
           </p:cNvPr>
@@ -23746,7 +23985,7 @@
           <p:cNvPr id="7" name="TextBox 6">
             <a:extLst>
               <a:ext uri="{FF2B5EF4-FFF2-40B4-BE49-F238E27FC236}">
-                <a16:creationId xmlns="" xmlns:a16="http://schemas.microsoft.com/office/drawing/2014/main" id="{1F77591A-DB2F-9F91-4945-B2EC29845B38}"/>
+                <a16:creationId xmlns:a16="http://schemas.microsoft.com/office/drawing/2014/main" xmlns="" id="{1F77591A-DB2F-9F91-4945-B2EC29845B38}"/>
               </a:ext>
             </a:extLst>
           </p:cNvPr>
@@ -23862,7 +24101,7 @@
           <p:cNvPr id="8" name="Picture 7">
             <a:extLst>
               <a:ext uri="{FF2B5EF4-FFF2-40B4-BE49-F238E27FC236}">
-                <a16:creationId xmlns="" xmlns:a16="http://schemas.microsoft.com/office/drawing/2014/main" id="{B643EA6D-4B4D-8F4A-AF04-E12FB151ED2B}"/>
+                <a16:creationId xmlns:a16="http://schemas.microsoft.com/office/drawing/2014/main" xmlns="" id="{B643EA6D-4B4D-8F4A-AF04-E12FB151ED2B}"/>
               </a:ext>
             </a:extLst>
           </p:cNvPr>
@@ -23892,7 +24131,7 @@
           <p:cNvPr id="9" name="TextBox 8">
             <a:extLst>
               <a:ext uri="{FF2B5EF4-FFF2-40B4-BE49-F238E27FC236}">
-                <a16:creationId xmlns="" xmlns:a16="http://schemas.microsoft.com/office/drawing/2014/main" id="{4CEDAA70-1CF5-7892-405B-9D24EFE25BE8}"/>
+                <a16:creationId xmlns:a16="http://schemas.microsoft.com/office/drawing/2014/main" xmlns="" id="{4CEDAA70-1CF5-7892-405B-9D24EFE25BE8}"/>
               </a:ext>
             </a:extLst>
           </p:cNvPr>

</xml_diff>

<commit_message>
Account lock out functionality added
</commit_message>
<xml_diff>
--- a/Slides/NET 6 Clean Architecture.pptx
+++ b/Slides/NET 6 Clean Architecture.pptx
@@ -23,6 +23,7 @@
     <p:sldId id="271" r:id="rId17"/>
     <p:sldId id="272" r:id="rId18"/>
     <p:sldId id="273" r:id="rId19"/>
+    <p:sldId id="274" r:id="rId20"/>
   </p:sldIdLst>
   <p:sldSz cx="12192000" cy="6858000"/>
   <p:notesSz cx="6858000" cy="9144000"/>
@@ -464,7 +465,7 @@
           <a:p>
             <a:fld id="{4852023B-35B4-406B-9C51-63D33C4B20A9}" type="datetimeFigureOut">
               <a:rPr lang="en-US" smtClean="0"/>
-              <a:t>4/25/2025</a:t>
+              <a:t>5/10/2025</a:t>
             </a:fld>
             <a:endParaRPr lang="en-US"/>
           </a:p>
@@ -1552,7 +1553,7 @@
           <a:p>
             <a:fld id="{4852023B-35B4-406B-9C51-63D33C4B20A9}" type="datetimeFigureOut">
               <a:rPr lang="en-US" smtClean="0"/>
-              <a:t>4/25/2025</a:t>
+              <a:t>5/10/2025</a:t>
             </a:fld>
             <a:endParaRPr lang="en-US"/>
           </a:p>
@@ -2532,7 +2533,7 @@
           <a:p>
             <a:fld id="{4852023B-35B4-406B-9C51-63D33C4B20A9}" type="datetimeFigureOut">
               <a:rPr lang="en-US" smtClean="0"/>
-              <a:t>4/25/2025</a:t>
+              <a:t>5/10/2025</a:t>
             </a:fld>
             <a:endParaRPr lang="en-US"/>
           </a:p>
@@ -3666,7 +3667,7 @@
           <a:p>
             <a:fld id="{4852023B-35B4-406B-9C51-63D33C4B20A9}" type="datetimeFigureOut">
               <a:rPr lang="en-US" smtClean="0"/>
-              <a:t>4/25/2025</a:t>
+              <a:t>5/10/2025</a:t>
             </a:fld>
             <a:endParaRPr lang="en-US"/>
           </a:p>
@@ -4699,7 +4700,7 @@
           <a:p>
             <a:fld id="{4852023B-35B4-406B-9C51-63D33C4B20A9}" type="datetimeFigureOut">
               <a:rPr lang="en-US" smtClean="0"/>
-              <a:t>4/25/2025</a:t>
+              <a:t>5/10/2025</a:t>
             </a:fld>
             <a:endParaRPr lang="en-US"/>
           </a:p>
@@ -5359,7 +5360,7 @@
           <a:p>
             <a:fld id="{4852023B-35B4-406B-9C51-63D33C4B20A9}" type="datetimeFigureOut">
               <a:rPr lang="en-US" smtClean="0"/>
-              <a:t>4/25/2025</a:t>
+              <a:t>5/10/2025</a:t>
             </a:fld>
             <a:endParaRPr lang="en-US"/>
           </a:p>
@@ -6220,7 +6221,7 @@
           <a:p>
             <a:fld id="{4852023B-35B4-406B-9C51-63D33C4B20A9}" type="datetimeFigureOut">
               <a:rPr lang="en-US" smtClean="0"/>
-              <a:t>4/25/2025</a:t>
+              <a:t>5/10/2025</a:t>
             </a:fld>
             <a:endParaRPr lang="en-US"/>
           </a:p>
@@ -6410,7 +6411,7 @@
           <a:p>
             <a:fld id="{4852023B-35B4-406B-9C51-63D33C4B20A9}" type="datetimeFigureOut">
               <a:rPr lang="en-US" smtClean="0"/>
-              <a:t>4/25/2025</a:t>
+              <a:t>5/10/2025</a:t>
             </a:fld>
             <a:endParaRPr lang="en-US"/>
           </a:p>
@@ -7382,7 +7383,7 @@
           <a:p>
             <a:fld id="{4852023B-35B4-406B-9C51-63D33C4B20A9}" type="datetimeFigureOut">
               <a:rPr lang="en-US" smtClean="0"/>
-              <a:t>4/25/2025</a:t>
+              <a:t>5/10/2025</a:t>
             </a:fld>
             <a:endParaRPr lang="en-US"/>
           </a:p>
@@ -7593,7 +7594,7 @@
           <a:p>
             <a:fld id="{4852023B-35B4-406B-9C51-63D33C4B20A9}" type="datetimeFigureOut">
               <a:rPr lang="en-US" smtClean="0"/>
-              <a:t>4/25/2025</a:t>
+              <a:t>5/10/2025</a:t>
             </a:fld>
             <a:endParaRPr lang="en-US"/>
           </a:p>
@@ -8627,7 +8628,7 @@
           <a:p>
             <a:fld id="{4852023B-35B4-406B-9C51-63D33C4B20A9}" type="datetimeFigureOut">
               <a:rPr lang="en-US" smtClean="0"/>
-              <a:t>4/25/2025</a:t>
+              <a:t>5/10/2025</a:t>
             </a:fld>
             <a:endParaRPr lang="en-US"/>
           </a:p>
@@ -8899,7 +8900,7 @@
           <a:p>
             <a:fld id="{4852023B-35B4-406B-9C51-63D33C4B20A9}" type="datetimeFigureOut">
               <a:rPr lang="en-US" smtClean="0"/>
-              <a:t>4/25/2025</a:t>
+              <a:t>5/10/2025</a:t>
             </a:fld>
             <a:endParaRPr lang="en-US"/>
           </a:p>
@@ -9309,7 +9310,7 @@
           <a:p>
             <a:fld id="{4852023B-35B4-406B-9C51-63D33C4B20A9}" type="datetimeFigureOut">
               <a:rPr lang="en-US" smtClean="0"/>
-              <a:t>4/25/2025</a:t>
+              <a:t>5/10/2025</a:t>
             </a:fld>
             <a:endParaRPr lang="en-US"/>
           </a:p>
@@ -9436,7 +9437,7 @@
           <a:p>
             <a:fld id="{4852023B-35B4-406B-9C51-63D33C4B20A9}" type="datetimeFigureOut">
               <a:rPr lang="en-US" smtClean="0"/>
-              <a:t>4/25/2025</a:t>
+              <a:t>5/10/2025</a:t>
             </a:fld>
             <a:endParaRPr lang="en-US"/>
           </a:p>
@@ -9531,7 +9532,7 @@
           <a:p>
             <a:fld id="{4852023B-35B4-406B-9C51-63D33C4B20A9}" type="datetimeFigureOut">
               <a:rPr lang="en-US" smtClean="0"/>
-              <a:t>4/25/2025</a:t>
+              <a:t>5/10/2025</a:t>
             </a:fld>
             <a:endParaRPr lang="en-US"/>
           </a:p>
@@ -10612,7 +10613,7 @@
           <a:p>
             <a:fld id="{4852023B-35B4-406B-9C51-63D33C4B20A9}" type="datetimeFigureOut">
               <a:rPr lang="en-US" smtClean="0"/>
-              <a:t>4/25/2025</a:t>
+              <a:t>5/10/2025</a:t>
             </a:fld>
             <a:endParaRPr lang="en-US"/>
           </a:p>
@@ -11720,7 +11721,7 @@
           <a:p>
             <a:fld id="{4852023B-35B4-406B-9C51-63D33C4B20A9}" type="datetimeFigureOut">
               <a:rPr lang="en-US" smtClean="0"/>
-              <a:t>4/25/2025</a:t>
+              <a:t>5/10/2025</a:t>
             </a:fld>
             <a:endParaRPr lang="en-US"/>
           </a:p>
@@ -12717,7 +12718,7 @@
           <a:p>
             <a:fld id="{4852023B-35B4-406B-9C51-63D33C4B20A9}" type="datetimeFigureOut">
               <a:rPr lang="en-US" smtClean="0"/>
-              <a:t>4/25/2025</a:t>
+              <a:t>5/10/2025</a:t>
             </a:fld>
             <a:endParaRPr lang="en-US"/>
           </a:p>
@@ -13281,7 +13282,7 @@
           <p:cNvPr id="9" name="TextBox 8">
             <a:extLst>
               <a:ext uri="{FF2B5EF4-FFF2-40B4-BE49-F238E27FC236}">
-                <a16:creationId xmlns="" xmlns:a16="http://schemas.microsoft.com/office/drawing/2014/main" id="{39BB7DC7-8A14-75D0-DB09-D55D93EBFBF9}"/>
+                <a16:creationId xmlns:a16="http://schemas.microsoft.com/office/drawing/2014/main" xmlns="" id="{39BB7DC7-8A14-75D0-DB09-D55D93EBFBF9}"/>
               </a:ext>
             </a:extLst>
           </p:cNvPr>
@@ -13313,7 +13314,7 @@
           <p:cNvPr id="12" name="Title 1">
             <a:extLst>
               <a:ext uri="{FF2B5EF4-FFF2-40B4-BE49-F238E27FC236}">
-                <a16:creationId xmlns="" xmlns:a16="http://schemas.microsoft.com/office/drawing/2014/main" id="{6BC09C08-DB38-0216-C707-8BA1E2DE56E4}"/>
+                <a16:creationId xmlns:a16="http://schemas.microsoft.com/office/drawing/2014/main" xmlns="" id="{6BC09C08-DB38-0216-C707-8BA1E2DE56E4}"/>
               </a:ext>
             </a:extLst>
           </p:cNvPr>
@@ -13346,7 +13347,7 @@
           <p:cNvPr id="2" name="TextBox 1">
             <a:extLst>
               <a:ext uri="{FF2B5EF4-FFF2-40B4-BE49-F238E27FC236}">
-                <a16:creationId xmlns="" xmlns:a16="http://schemas.microsoft.com/office/drawing/2014/main" id="{5BE8E56B-D104-CC08-48F4-D487AF749C7B}"/>
+                <a16:creationId xmlns:a16="http://schemas.microsoft.com/office/drawing/2014/main" xmlns="" id="{5BE8E56B-D104-CC08-48F4-D487AF749C7B}"/>
               </a:ext>
             </a:extLst>
           </p:cNvPr>
@@ -13449,7 +13450,7 @@
           <p:cNvPr id="3" name="TextBox 2">
             <a:extLst>
               <a:ext uri="{FF2B5EF4-FFF2-40B4-BE49-F238E27FC236}">
-                <a16:creationId xmlns="" xmlns:a16="http://schemas.microsoft.com/office/drawing/2014/main" id="{C8D9D74B-ED7B-F70B-3A5B-5356FA257D36}"/>
+                <a16:creationId xmlns:a16="http://schemas.microsoft.com/office/drawing/2014/main" xmlns="" id="{C8D9D74B-ED7B-F70B-3A5B-5356FA257D36}"/>
               </a:ext>
             </a:extLst>
           </p:cNvPr>
@@ -13541,7 +13542,7 @@
           <p:cNvPr id="7" name="Picture 6">
             <a:extLst>
               <a:ext uri="{FF2B5EF4-FFF2-40B4-BE49-F238E27FC236}">
-                <a16:creationId xmlns="" xmlns:a16="http://schemas.microsoft.com/office/drawing/2014/main" id="{85923558-9D5B-B7D9-795E-A80B0F560AC1}"/>
+                <a16:creationId xmlns:a16="http://schemas.microsoft.com/office/drawing/2014/main" xmlns="" id="{85923558-9D5B-B7D9-795E-A80B0F560AC1}"/>
               </a:ext>
             </a:extLst>
           </p:cNvPr>
@@ -13571,7 +13572,7 @@
           <p:cNvPr id="8" name="TextBox 7">
             <a:extLst>
               <a:ext uri="{FF2B5EF4-FFF2-40B4-BE49-F238E27FC236}">
-                <a16:creationId xmlns="" xmlns:a16="http://schemas.microsoft.com/office/drawing/2014/main" id="{5B300213-A76B-1DF1-2F8D-7B7E5749DD9D}"/>
+                <a16:creationId xmlns:a16="http://schemas.microsoft.com/office/drawing/2014/main" xmlns="" id="{5B300213-A76B-1DF1-2F8D-7B7E5749DD9D}"/>
               </a:ext>
             </a:extLst>
           </p:cNvPr>
@@ -14054,7 +14055,7 @@
           <p:cNvPr id="4" name="Title 1">
             <a:extLst>
               <a:ext uri="{FF2B5EF4-FFF2-40B4-BE49-F238E27FC236}">
-                <a16:creationId xmlns="" xmlns:a16="http://schemas.microsoft.com/office/drawing/2014/main" id="{0A4045B0-C940-93C6-79DB-351A147113E4}"/>
+                <a16:creationId xmlns:a16="http://schemas.microsoft.com/office/drawing/2014/main" xmlns="" id="{0A4045B0-C940-93C6-79DB-351A147113E4}"/>
               </a:ext>
             </a:extLst>
           </p:cNvPr>
@@ -14087,7 +14088,7 @@
           <p:cNvPr id="7" name="TextBox 6">
             <a:extLst>
               <a:ext uri="{FF2B5EF4-FFF2-40B4-BE49-F238E27FC236}">
-                <a16:creationId xmlns="" xmlns:a16="http://schemas.microsoft.com/office/drawing/2014/main" id="{1F77591A-DB2F-9F91-4945-B2EC29845B38}"/>
+                <a16:creationId xmlns:a16="http://schemas.microsoft.com/office/drawing/2014/main" xmlns="" id="{1F77591A-DB2F-9F91-4945-B2EC29845B38}"/>
               </a:ext>
             </a:extLst>
           </p:cNvPr>
@@ -14151,7 +14152,7 @@
           <p:cNvPr id="3" name="TextBox 2">
             <a:extLst>
               <a:ext uri="{FF2B5EF4-FFF2-40B4-BE49-F238E27FC236}">
-                <a16:creationId xmlns="" xmlns:a16="http://schemas.microsoft.com/office/drawing/2014/main" id="{75CE1D91-0A05-A797-DFCC-8AC0D954B8C4}"/>
+                <a16:creationId xmlns:a16="http://schemas.microsoft.com/office/drawing/2014/main" xmlns="" id="{75CE1D91-0A05-A797-DFCC-8AC0D954B8C4}"/>
               </a:ext>
             </a:extLst>
           </p:cNvPr>
@@ -14230,7 +14231,7 @@
           <p:cNvPr id="5" name="TextBox 4">
             <a:extLst>
               <a:ext uri="{FF2B5EF4-FFF2-40B4-BE49-F238E27FC236}">
-                <a16:creationId xmlns="" xmlns:a16="http://schemas.microsoft.com/office/drawing/2014/main" id="{D3A024AE-BC83-07F5-3885-BC864E91208B}"/>
+                <a16:creationId xmlns:a16="http://schemas.microsoft.com/office/drawing/2014/main" xmlns="" id="{D3A024AE-BC83-07F5-3885-BC864E91208B}"/>
               </a:ext>
             </a:extLst>
           </p:cNvPr>
@@ -14277,7 +14278,7 @@
           <p:cNvPr id="14" name="Picture 13">
             <a:extLst>
               <a:ext uri="{FF2B5EF4-FFF2-40B4-BE49-F238E27FC236}">
-                <a16:creationId xmlns="" xmlns:a16="http://schemas.microsoft.com/office/drawing/2014/main" id="{21282115-67E0-FC53-E5ED-24264FAF013C}"/>
+                <a16:creationId xmlns:a16="http://schemas.microsoft.com/office/drawing/2014/main" xmlns="" id="{21282115-67E0-FC53-E5ED-24264FAF013C}"/>
               </a:ext>
             </a:extLst>
           </p:cNvPr>
@@ -14661,7 +14662,7 @@
           <p:cNvPr id="4" name="Title 1">
             <a:extLst>
               <a:ext uri="{FF2B5EF4-FFF2-40B4-BE49-F238E27FC236}">
-                <a16:creationId xmlns="" xmlns:a16="http://schemas.microsoft.com/office/drawing/2014/main" id="{0A4045B0-C940-93C6-79DB-351A147113E4}"/>
+                <a16:creationId xmlns:a16="http://schemas.microsoft.com/office/drawing/2014/main" xmlns="" id="{0A4045B0-C940-93C6-79DB-351A147113E4}"/>
               </a:ext>
             </a:extLst>
           </p:cNvPr>
@@ -14694,7 +14695,7 @@
           <p:cNvPr id="7" name="TextBox 6">
             <a:extLst>
               <a:ext uri="{FF2B5EF4-FFF2-40B4-BE49-F238E27FC236}">
-                <a16:creationId xmlns="" xmlns:a16="http://schemas.microsoft.com/office/drawing/2014/main" id="{1F77591A-DB2F-9F91-4945-B2EC29845B38}"/>
+                <a16:creationId xmlns:a16="http://schemas.microsoft.com/office/drawing/2014/main" xmlns="" id="{1F77591A-DB2F-9F91-4945-B2EC29845B38}"/>
               </a:ext>
             </a:extLst>
           </p:cNvPr>
@@ -14796,7 +14797,7 @@
           <p:cNvPr id="6" name="TextBox 5">
             <a:extLst>
               <a:ext uri="{FF2B5EF4-FFF2-40B4-BE49-F238E27FC236}">
-                <a16:creationId xmlns="" xmlns:a16="http://schemas.microsoft.com/office/drawing/2014/main" id="{9CA64FD6-BEA4-2353-8A07-33D717CADA3A}"/>
+                <a16:creationId xmlns:a16="http://schemas.microsoft.com/office/drawing/2014/main" xmlns="" id="{9CA64FD6-BEA4-2353-8A07-33D717CADA3A}"/>
               </a:ext>
             </a:extLst>
           </p:cNvPr>
@@ -14892,7 +14893,7 @@
           <p:cNvPr id="10" name="TextBox 9">
             <a:extLst>
               <a:ext uri="{FF2B5EF4-FFF2-40B4-BE49-F238E27FC236}">
-                <a16:creationId xmlns="" xmlns:a16="http://schemas.microsoft.com/office/drawing/2014/main" id="{C89914A2-3B6D-D077-104F-47737F2D1CC9}"/>
+                <a16:creationId xmlns:a16="http://schemas.microsoft.com/office/drawing/2014/main" xmlns="" id="{C89914A2-3B6D-D077-104F-47737F2D1CC9}"/>
               </a:ext>
             </a:extLst>
           </p:cNvPr>
@@ -15085,7 +15086,7 @@
           <p:cNvPr id="12" name="TextBox 11">
             <a:extLst>
               <a:ext uri="{FF2B5EF4-FFF2-40B4-BE49-F238E27FC236}">
-                <a16:creationId xmlns="" xmlns:a16="http://schemas.microsoft.com/office/drawing/2014/main" id="{12B26B99-AF94-9433-984F-83ACFDE565BB}"/>
+                <a16:creationId xmlns:a16="http://schemas.microsoft.com/office/drawing/2014/main" xmlns="" id="{12B26B99-AF94-9433-984F-83ACFDE565BB}"/>
               </a:ext>
             </a:extLst>
           </p:cNvPr>
@@ -15296,7 +15297,7 @@
           <p:cNvPr id="8" name="Picture 7">
             <a:extLst>
               <a:ext uri="{FF2B5EF4-FFF2-40B4-BE49-F238E27FC236}">
-                <a16:creationId xmlns="" xmlns:a16="http://schemas.microsoft.com/office/drawing/2014/main" id="{CC045C0D-B68C-E07A-C5D4-4E8FBA8837BB}"/>
+                <a16:creationId xmlns:a16="http://schemas.microsoft.com/office/drawing/2014/main" xmlns="" id="{CC045C0D-B68C-E07A-C5D4-4E8FBA8837BB}"/>
               </a:ext>
             </a:extLst>
           </p:cNvPr>
@@ -15788,7 +15789,7 @@
           <p:cNvPr id="4" name="Title 1">
             <a:extLst>
               <a:ext uri="{FF2B5EF4-FFF2-40B4-BE49-F238E27FC236}">
-                <a16:creationId xmlns="" xmlns:a16="http://schemas.microsoft.com/office/drawing/2014/main" id="{0A4045B0-C940-93C6-79DB-351A147113E4}"/>
+                <a16:creationId xmlns:a16="http://schemas.microsoft.com/office/drawing/2014/main" xmlns="" id="{0A4045B0-C940-93C6-79DB-351A147113E4}"/>
               </a:ext>
             </a:extLst>
           </p:cNvPr>
@@ -15825,7 +15826,7 @@
           <p:cNvPr id="7" name="TextBox 6">
             <a:extLst>
               <a:ext uri="{FF2B5EF4-FFF2-40B4-BE49-F238E27FC236}">
-                <a16:creationId xmlns="" xmlns:a16="http://schemas.microsoft.com/office/drawing/2014/main" id="{1F77591A-DB2F-9F91-4945-B2EC29845B38}"/>
+                <a16:creationId xmlns:a16="http://schemas.microsoft.com/office/drawing/2014/main" xmlns="" id="{1F77591A-DB2F-9F91-4945-B2EC29845B38}"/>
               </a:ext>
             </a:extLst>
           </p:cNvPr>
@@ -16010,7 +16011,7 @@
           <p:cNvPr id="6" name="TextBox 5">
             <a:extLst>
               <a:ext uri="{FF2B5EF4-FFF2-40B4-BE49-F238E27FC236}">
-                <a16:creationId xmlns="" xmlns:a16="http://schemas.microsoft.com/office/drawing/2014/main" id="{9CA64FD6-BEA4-2353-8A07-33D717CADA3A}"/>
+                <a16:creationId xmlns:a16="http://schemas.microsoft.com/office/drawing/2014/main" xmlns="" id="{9CA64FD6-BEA4-2353-8A07-33D717CADA3A}"/>
               </a:ext>
             </a:extLst>
           </p:cNvPr>
@@ -16092,7 +16093,7 @@
           <p:cNvPr id="2" name="TextBox 1">
             <a:extLst>
               <a:ext uri="{FF2B5EF4-FFF2-40B4-BE49-F238E27FC236}">
-                <a16:creationId xmlns="" xmlns:a16="http://schemas.microsoft.com/office/drawing/2014/main" id="{AA2BD717-B48B-3A0B-5C27-23A0C68D8B05}"/>
+                <a16:creationId xmlns:a16="http://schemas.microsoft.com/office/drawing/2014/main" xmlns="" id="{AA2BD717-B48B-3A0B-5C27-23A0C68D8B05}"/>
               </a:ext>
             </a:extLst>
           </p:cNvPr>
@@ -16257,7 +16258,7 @@
           <p:cNvPr id="9" name="Picture 8">
             <a:extLst>
               <a:ext uri="{FF2B5EF4-FFF2-40B4-BE49-F238E27FC236}">
-                <a16:creationId xmlns="" xmlns:a16="http://schemas.microsoft.com/office/drawing/2014/main" id="{A38831D7-BB3B-C1F8-17D3-97CD0AD42136}"/>
+                <a16:creationId xmlns:a16="http://schemas.microsoft.com/office/drawing/2014/main" xmlns="" id="{A38831D7-BB3B-C1F8-17D3-97CD0AD42136}"/>
               </a:ext>
             </a:extLst>
           </p:cNvPr>
@@ -16649,7 +16650,7 @@
           <p:cNvPr id="4" name="Title 1">
             <a:extLst>
               <a:ext uri="{FF2B5EF4-FFF2-40B4-BE49-F238E27FC236}">
-                <a16:creationId xmlns="" xmlns:a16="http://schemas.microsoft.com/office/drawing/2014/main" id="{0A4045B0-C940-93C6-79DB-351A147113E4}"/>
+                <a16:creationId xmlns:a16="http://schemas.microsoft.com/office/drawing/2014/main" xmlns="" id="{0A4045B0-C940-93C6-79DB-351A147113E4}"/>
               </a:ext>
             </a:extLst>
           </p:cNvPr>
@@ -16690,7 +16691,7 @@
           <p:cNvPr id="7" name="TextBox 6">
             <a:extLst>
               <a:ext uri="{FF2B5EF4-FFF2-40B4-BE49-F238E27FC236}">
-                <a16:creationId xmlns="" xmlns:a16="http://schemas.microsoft.com/office/drawing/2014/main" id="{1F77591A-DB2F-9F91-4945-B2EC29845B38}"/>
+                <a16:creationId xmlns:a16="http://schemas.microsoft.com/office/drawing/2014/main" xmlns="" id="{1F77591A-DB2F-9F91-4945-B2EC29845B38}"/>
               </a:ext>
             </a:extLst>
           </p:cNvPr>
@@ -16744,7 +16745,7 @@
           <p:cNvPr id="5" name="Picture 4">
             <a:extLst>
               <a:ext uri="{FF2B5EF4-FFF2-40B4-BE49-F238E27FC236}">
-                <a16:creationId xmlns="" xmlns:a16="http://schemas.microsoft.com/office/drawing/2014/main" id="{415966A0-7DD5-0960-C994-7A2F3B3FD0AC}"/>
+                <a16:creationId xmlns:a16="http://schemas.microsoft.com/office/drawing/2014/main" xmlns="" id="{415966A0-7DD5-0960-C994-7A2F3B3FD0AC}"/>
               </a:ext>
             </a:extLst>
           </p:cNvPr>
@@ -16936,7 +16937,7 @@
           <p:cNvPr id="4" name="Title 1">
             <a:extLst>
               <a:ext uri="{FF2B5EF4-FFF2-40B4-BE49-F238E27FC236}">
-                <a16:creationId xmlns="" xmlns:a16="http://schemas.microsoft.com/office/drawing/2014/main" id="{0A4045B0-C940-93C6-79DB-351A147113E4}"/>
+                <a16:creationId xmlns:a16="http://schemas.microsoft.com/office/drawing/2014/main" xmlns="" id="{0A4045B0-C940-93C6-79DB-351A147113E4}"/>
               </a:ext>
             </a:extLst>
           </p:cNvPr>
@@ -17270,7 +17271,7 @@
           <p:cNvPr id="4" name="Title 1">
             <a:extLst>
               <a:ext uri="{FF2B5EF4-FFF2-40B4-BE49-F238E27FC236}">
-                <a16:creationId xmlns="" xmlns:a16="http://schemas.microsoft.com/office/drawing/2014/main" id="{0A4045B0-C940-93C6-79DB-351A147113E4}"/>
+                <a16:creationId xmlns:a16="http://schemas.microsoft.com/office/drawing/2014/main" xmlns="" id="{0A4045B0-C940-93C6-79DB-351A147113E4}"/>
               </a:ext>
             </a:extLst>
           </p:cNvPr>
@@ -17304,7 +17305,7 @@
           <p:cNvPr id="7" name="TextBox 6">
             <a:extLst>
               <a:ext uri="{FF2B5EF4-FFF2-40B4-BE49-F238E27FC236}">
-                <a16:creationId xmlns="" xmlns:a16="http://schemas.microsoft.com/office/drawing/2014/main" id="{1F77591A-DB2F-9F91-4945-B2EC29845B38}"/>
+                <a16:creationId xmlns:a16="http://schemas.microsoft.com/office/drawing/2014/main" xmlns="" id="{1F77591A-DB2F-9F91-4945-B2EC29845B38}"/>
               </a:ext>
             </a:extLst>
           </p:cNvPr>
@@ -17853,7 +17854,7 @@
           <p:cNvPr id="4" name="Title 1">
             <a:extLst>
               <a:ext uri="{FF2B5EF4-FFF2-40B4-BE49-F238E27FC236}">
-                <a16:creationId xmlns="" xmlns:a16="http://schemas.microsoft.com/office/drawing/2014/main" id="{0A4045B0-C940-93C6-79DB-351A147113E4}"/>
+                <a16:creationId xmlns:a16="http://schemas.microsoft.com/office/drawing/2014/main" xmlns="" id="{0A4045B0-C940-93C6-79DB-351A147113E4}"/>
               </a:ext>
             </a:extLst>
           </p:cNvPr>
@@ -18306,7 +18307,7 @@
           <p:cNvPr id="4" name="Title 1">
             <a:extLst>
               <a:ext uri="{FF2B5EF4-FFF2-40B4-BE49-F238E27FC236}">
-                <a16:creationId xmlns="" xmlns:a16="http://schemas.microsoft.com/office/drawing/2014/main" id="{0A4045B0-C940-93C6-79DB-351A147113E4}"/>
+                <a16:creationId xmlns:a16="http://schemas.microsoft.com/office/drawing/2014/main" xmlns="" id="{0A4045B0-C940-93C6-79DB-351A147113E4}"/>
               </a:ext>
             </a:extLst>
           </p:cNvPr>
@@ -18518,7 +18519,7 @@
           <p:cNvPr id="4" name="Title 1">
             <a:extLst>
               <a:ext uri="{FF2B5EF4-FFF2-40B4-BE49-F238E27FC236}">
-                <a16:creationId xmlns="" xmlns:a16="http://schemas.microsoft.com/office/drawing/2014/main" id="{0A4045B0-C940-93C6-79DB-351A147113E4}"/>
+                <a16:creationId xmlns:a16="http://schemas.microsoft.com/office/drawing/2014/main" xmlns="" id="{0A4045B0-C940-93C6-79DB-351A147113E4}"/>
               </a:ext>
             </a:extLst>
           </p:cNvPr>
@@ -18585,27 +18586,7 @@
                   </a:schemeClr>
                 </a:solidFill>
               </a:rPr>
-              <a:t> </a:t>
-            </a:r>
-            <a:r>
-              <a:rPr lang="en-US" sz="6600" b="1" dirty="0" smtClean="0">
-                <a:solidFill>
-                  <a:schemeClr val="bg1">
-                    <a:lumMod val="95000"/>
-                  </a:schemeClr>
-                </a:solidFill>
-              </a:rPr>
-              <a:t>Core</a:t>
-            </a:r>
-            <a:r>
-              <a:rPr lang="en-US" sz="6600" b="1" dirty="0" smtClean="0">
-                <a:solidFill>
-                  <a:schemeClr val="bg1">
-                    <a:lumMod val="95000"/>
-                  </a:schemeClr>
-                </a:solidFill>
-              </a:rPr>
-              <a:t/>
+              <a:t> Core</a:t>
             </a:r>
             <a:br>
               <a:rPr lang="en-US" sz="6600" b="1" dirty="0" smtClean="0">
@@ -18701,6 +18682,73 @@
 </p:sld>
 </file>
 
+<file path=ppt/slides/slide19.xml><?xml version="1.0" encoding="utf-8"?>
+<p:sld xmlns:a="http://schemas.openxmlformats.org/drawingml/2006/main" xmlns:r="http://schemas.openxmlformats.org/officeDocument/2006/relationships" xmlns:p="http://schemas.openxmlformats.org/presentationml/2006/main">
+  <p:cSld>
+    <p:spTree>
+      <p:nvGrpSpPr>
+        <p:cNvPr id="1" name=""/>
+        <p:cNvGrpSpPr/>
+        <p:nvPr/>
+      </p:nvGrpSpPr>
+      <p:grpSpPr>
+        <a:xfrm>
+          <a:off x="0" y="0"/>
+          <a:ext cx="0" cy="0"/>
+          <a:chOff x="0" y="0"/>
+          <a:chExt cx="0" cy="0"/>
+        </a:xfrm>
+      </p:grpSpPr>
+      <p:pic>
+        <p:nvPicPr>
+          <p:cNvPr id="8" name="Picture 7"/>
+          <p:cNvPicPr>
+            <a:picLocks noChangeAspect="1"/>
+          </p:cNvPicPr>
+          <p:nvPr/>
+        </p:nvPicPr>
+        <p:blipFill>
+          <a:blip r:embed="rId2">
+            <a:extLst>
+              <a:ext uri="{28A0092B-C50C-407E-A947-70E740481C1C}">
+                <a14:useLocalDpi xmlns:a14="http://schemas.microsoft.com/office/drawing/2010/main" val="0"/>
+              </a:ext>
+            </a:extLst>
+          </a:blip>
+          <a:stretch>
+            <a:fillRect/>
+          </a:stretch>
+        </p:blipFill>
+        <p:spPr>
+          <a:xfrm>
+            <a:off x="1117964" y="618307"/>
+            <a:ext cx="8792391" cy="5621054"/>
+          </a:xfrm>
+          <a:prstGeom prst="rect">
+            <a:avLst/>
+          </a:prstGeom>
+        </p:spPr>
+      </p:pic>
+    </p:spTree>
+    <p:extLst>
+      <p:ext uri="{BB962C8B-B14F-4D97-AF65-F5344CB8AC3E}">
+        <p14:creationId xmlns:p14="http://schemas.microsoft.com/office/powerpoint/2010/main" val="2921649511"/>
+      </p:ext>
+    </p:extLst>
+  </p:cSld>
+  <p:clrMapOvr>
+    <a:masterClrMapping/>
+  </p:clrMapOvr>
+  <p:timing>
+    <p:tnLst>
+      <p:par>
+        <p:cTn id="1" dur="indefinite" restart="never" nodeType="tmRoot"/>
+      </p:par>
+    </p:tnLst>
+  </p:timing>
+</p:sld>
+</file>
+
 <file path=ppt/slides/slide2.xml><?xml version="1.0" encoding="utf-8"?>
 <p:sld xmlns:a="http://schemas.openxmlformats.org/drawingml/2006/main" xmlns:r="http://schemas.openxmlformats.org/officeDocument/2006/relationships" xmlns:p="http://schemas.openxmlformats.org/presentationml/2006/main">
   <p:cSld>
@@ -18723,7 +18771,7 @@
           <p:cNvPr id="14" name="TextBox 13">
             <a:extLst>
               <a:ext uri="{FF2B5EF4-FFF2-40B4-BE49-F238E27FC236}">
-                <a16:creationId xmlns="" xmlns:a16="http://schemas.microsoft.com/office/drawing/2014/main" id="{2D6E2A5E-967C-56EE-C60B-33A0A449ADC0}"/>
+                <a16:creationId xmlns:a16="http://schemas.microsoft.com/office/drawing/2014/main" xmlns="" id="{2D6E2A5E-967C-56EE-C60B-33A0A449ADC0}"/>
               </a:ext>
             </a:extLst>
           </p:cNvPr>
@@ -18768,7 +18816,7 @@
           <p:cNvPr id="15" name="TextBox 14">
             <a:extLst>
               <a:ext uri="{FF2B5EF4-FFF2-40B4-BE49-F238E27FC236}">
-                <a16:creationId xmlns="" xmlns:a16="http://schemas.microsoft.com/office/drawing/2014/main" id="{3E986115-D58B-7571-A6A0-D672A63D6191}"/>
+                <a16:creationId xmlns:a16="http://schemas.microsoft.com/office/drawing/2014/main" xmlns="" id="{3E986115-D58B-7571-A6A0-D672A63D6191}"/>
               </a:ext>
             </a:extLst>
           </p:cNvPr>
@@ -18878,7 +18926,7 @@
           <p:cNvPr id="18" name="TextBox 17">
             <a:extLst>
               <a:ext uri="{FF2B5EF4-FFF2-40B4-BE49-F238E27FC236}">
-                <a16:creationId xmlns="" xmlns:a16="http://schemas.microsoft.com/office/drawing/2014/main" id="{66A86D0B-A6B0-D5E5-0596-7362FA59BAF6}"/>
+                <a16:creationId xmlns:a16="http://schemas.microsoft.com/office/drawing/2014/main" xmlns="" id="{66A86D0B-A6B0-D5E5-0596-7362FA59BAF6}"/>
               </a:ext>
             </a:extLst>
           </p:cNvPr>
@@ -18932,7 +18980,7 @@
           <p:cNvPr id="20" name="TextBox 19">
             <a:extLst>
               <a:ext uri="{FF2B5EF4-FFF2-40B4-BE49-F238E27FC236}">
-                <a16:creationId xmlns="" xmlns:a16="http://schemas.microsoft.com/office/drawing/2014/main" id="{0079DF3F-C0DE-642F-2ED9-10544F59D43B}"/>
+                <a16:creationId xmlns:a16="http://schemas.microsoft.com/office/drawing/2014/main" xmlns="" id="{0079DF3F-C0DE-642F-2ED9-10544F59D43B}"/>
               </a:ext>
             </a:extLst>
           </p:cNvPr>
@@ -18999,7 +19047,7 @@
           <p:cNvPr id="25" name="TextBox 24">
             <a:extLst>
               <a:ext uri="{FF2B5EF4-FFF2-40B4-BE49-F238E27FC236}">
-                <a16:creationId xmlns="" xmlns:a16="http://schemas.microsoft.com/office/drawing/2014/main" id="{198E47A3-C3A7-7CD4-200F-D6F44FE978FD}"/>
+                <a16:creationId xmlns:a16="http://schemas.microsoft.com/office/drawing/2014/main" xmlns="" id="{198E47A3-C3A7-7CD4-200F-D6F44FE978FD}"/>
               </a:ext>
             </a:extLst>
           </p:cNvPr>
@@ -19454,7 +19502,7 @@
           <p:cNvPr id="26" name="TextBox 25">
             <a:extLst>
               <a:ext uri="{FF2B5EF4-FFF2-40B4-BE49-F238E27FC236}">
-                <a16:creationId xmlns="" xmlns:a16="http://schemas.microsoft.com/office/drawing/2014/main" id="{37BEBCE1-74C6-5499-F88C-F8AE8BE63895}"/>
+                <a16:creationId xmlns:a16="http://schemas.microsoft.com/office/drawing/2014/main" xmlns="" id="{37BEBCE1-74C6-5499-F88C-F8AE8BE63895}"/>
               </a:ext>
             </a:extLst>
           </p:cNvPr>
@@ -19508,7 +19556,7 @@
           <p:cNvPr id="27" name="TextBox 26">
             <a:extLst>
               <a:ext uri="{FF2B5EF4-FFF2-40B4-BE49-F238E27FC236}">
-                <a16:creationId xmlns="" xmlns:a16="http://schemas.microsoft.com/office/drawing/2014/main" id="{828B7BCB-60B4-7021-116C-92B338033765}"/>
+                <a16:creationId xmlns:a16="http://schemas.microsoft.com/office/drawing/2014/main" xmlns="" id="{828B7BCB-60B4-7021-116C-92B338033765}"/>
               </a:ext>
             </a:extLst>
           </p:cNvPr>
@@ -19669,7 +19717,7 @@
           <p:cNvPr id="7" name="Title 1">
             <a:extLst>
               <a:ext uri="{FF2B5EF4-FFF2-40B4-BE49-F238E27FC236}">
-                <a16:creationId xmlns="" xmlns:a16="http://schemas.microsoft.com/office/drawing/2014/main" id="{0CE071D6-AF8F-9C57-F47E-6B74823ED513}"/>
+                <a16:creationId xmlns:a16="http://schemas.microsoft.com/office/drawing/2014/main" xmlns="" id="{0CE071D6-AF8F-9C57-F47E-6B74823ED513}"/>
               </a:ext>
             </a:extLst>
           </p:cNvPr>
@@ -20316,7 +20364,7 @@
           <p:cNvPr id="5" name="TextBox 4">
             <a:extLst>
               <a:ext uri="{FF2B5EF4-FFF2-40B4-BE49-F238E27FC236}">
-                <a16:creationId xmlns="" xmlns:a16="http://schemas.microsoft.com/office/drawing/2014/main" id="{FD94C650-D2EC-5A80-D053-15314A15912E}"/>
+                <a16:creationId xmlns:a16="http://schemas.microsoft.com/office/drawing/2014/main" xmlns="" id="{FD94C650-D2EC-5A80-D053-15314A15912E}"/>
               </a:ext>
             </a:extLst>
           </p:cNvPr>
@@ -20449,7 +20497,7 @@
           <p:cNvPr id="6" name="Title 1">
             <a:extLst>
               <a:ext uri="{FF2B5EF4-FFF2-40B4-BE49-F238E27FC236}">
-                <a16:creationId xmlns="" xmlns:a16="http://schemas.microsoft.com/office/drawing/2014/main" id="{C8AD9B0B-5832-FBE1-7CAF-B5DC8714288E}"/>
+                <a16:creationId xmlns:a16="http://schemas.microsoft.com/office/drawing/2014/main" xmlns="" id="{C8AD9B0B-5832-FBE1-7CAF-B5DC8714288E}"/>
               </a:ext>
             </a:extLst>
           </p:cNvPr>
@@ -20482,7 +20530,7 @@
           <p:cNvPr id="8" name="TextBox 7">
             <a:extLst>
               <a:ext uri="{FF2B5EF4-FFF2-40B4-BE49-F238E27FC236}">
-                <a16:creationId xmlns="" xmlns:a16="http://schemas.microsoft.com/office/drawing/2014/main" id="{05C97F0F-A9E3-7357-C0E8-A15545E41298}"/>
+                <a16:creationId xmlns:a16="http://schemas.microsoft.com/office/drawing/2014/main" xmlns="" id="{05C97F0F-A9E3-7357-C0E8-A15545E41298}"/>
               </a:ext>
             </a:extLst>
           </p:cNvPr>
@@ -20628,7 +20676,7 @@
           <p:cNvPr id="2" name="TextBox 1">
             <a:extLst>
               <a:ext uri="{FF2B5EF4-FFF2-40B4-BE49-F238E27FC236}">
-                <a16:creationId xmlns="" xmlns:a16="http://schemas.microsoft.com/office/drawing/2014/main" id="{FAFC4B0A-4EC1-C95B-BF8E-F2E4C60860C7}"/>
+                <a16:creationId xmlns:a16="http://schemas.microsoft.com/office/drawing/2014/main" xmlns="" id="{FAFC4B0A-4EC1-C95B-BF8E-F2E4C60860C7}"/>
               </a:ext>
             </a:extLst>
           </p:cNvPr>
@@ -21087,7 +21135,7 @@
           <p:cNvPr id="4" name="Title 1">
             <a:extLst>
               <a:ext uri="{FF2B5EF4-FFF2-40B4-BE49-F238E27FC236}">
-                <a16:creationId xmlns="" xmlns:a16="http://schemas.microsoft.com/office/drawing/2014/main" id="{0A4045B0-C940-93C6-79DB-351A147113E4}"/>
+                <a16:creationId xmlns:a16="http://schemas.microsoft.com/office/drawing/2014/main" xmlns="" id="{0A4045B0-C940-93C6-79DB-351A147113E4}"/>
               </a:ext>
             </a:extLst>
           </p:cNvPr>
@@ -21120,7 +21168,7 @@
           <p:cNvPr id="5" name="TextBox 4">
             <a:extLst>
               <a:ext uri="{FF2B5EF4-FFF2-40B4-BE49-F238E27FC236}">
-                <a16:creationId xmlns="" xmlns:a16="http://schemas.microsoft.com/office/drawing/2014/main" id="{68ED6C88-4D30-47B1-98F2-10B61639E784}"/>
+                <a16:creationId xmlns:a16="http://schemas.microsoft.com/office/drawing/2014/main" xmlns="" id="{68ED6C88-4D30-47B1-98F2-10B61639E784}"/>
               </a:ext>
             </a:extLst>
           </p:cNvPr>
@@ -21162,7 +21210,7 @@
           <p:cNvPr id="6" name="TextBox 5">
             <a:extLst>
               <a:ext uri="{FF2B5EF4-FFF2-40B4-BE49-F238E27FC236}">
-                <a16:creationId xmlns="" xmlns:a16="http://schemas.microsoft.com/office/drawing/2014/main" id="{DF3DBA21-50B3-332B-D2D0-1673209B9496}"/>
+                <a16:creationId xmlns:a16="http://schemas.microsoft.com/office/drawing/2014/main" xmlns="" id="{DF3DBA21-50B3-332B-D2D0-1673209B9496}"/>
               </a:ext>
             </a:extLst>
           </p:cNvPr>
@@ -21204,7 +21252,7 @@
           <p:cNvPr id="10" name="TextBox 9">
             <a:extLst>
               <a:ext uri="{FF2B5EF4-FFF2-40B4-BE49-F238E27FC236}">
-                <a16:creationId xmlns="" xmlns:a16="http://schemas.microsoft.com/office/drawing/2014/main" id="{95C399D3-9FFE-F9D2-8DD0-04F8296DD6C5}"/>
+                <a16:creationId xmlns:a16="http://schemas.microsoft.com/office/drawing/2014/main" xmlns="" id="{95C399D3-9FFE-F9D2-8DD0-04F8296DD6C5}"/>
               </a:ext>
             </a:extLst>
           </p:cNvPr>
@@ -21246,7 +21294,7 @@
           <p:cNvPr id="12" name="Picture 11">
             <a:extLst>
               <a:ext uri="{FF2B5EF4-FFF2-40B4-BE49-F238E27FC236}">
-                <a16:creationId xmlns="" xmlns:a16="http://schemas.microsoft.com/office/drawing/2014/main" id="{6F0558F7-9155-B500-7EB5-FE4B29AFAC65}"/>
+                <a16:creationId xmlns:a16="http://schemas.microsoft.com/office/drawing/2014/main" xmlns="" id="{6F0558F7-9155-B500-7EB5-FE4B29AFAC65}"/>
               </a:ext>
             </a:extLst>
           </p:cNvPr>
@@ -21638,7 +21686,7 @@
           <p:cNvPr id="4" name="Title 1">
             <a:extLst>
               <a:ext uri="{FF2B5EF4-FFF2-40B4-BE49-F238E27FC236}">
-                <a16:creationId xmlns="" xmlns:a16="http://schemas.microsoft.com/office/drawing/2014/main" id="{0A4045B0-C940-93C6-79DB-351A147113E4}"/>
+                <a16:creationId xmlns:a16="http://schemas.microsoft.com/office/drawing/2014/main" xmlns="" id="{0A4045B0-C940-93C6-79DB-351A147113E4}"/>
               </a:ext>
             </a:extLst>
           </p:cNvPr>
@@ -21671,7 +21719,7 @@
           <p:cNvPr id="5" name="TextBox 4">
             <a:extLst>
               <a:ext uri="{FF2B5EF4-FFF2-40B4-BE49-F238E27FC236}">
-                <a16:creationId xmlns="" xmlns:a16="http://schemas.microsoft.com/office/drawing/2014/main" id="{68ED6C88-4D30-47B1-98F2-10B61639E784}"/>
+                <a16:creationId xmlns:a16="http://schemas.microsoft.com/office/drawing/2014/main" xmlns="" id="{68ED6C88-4D30-47B1-98F2-10B61639E784}"/>
               </a:ext>
             </a:extLst>
           </p:cNvPr>
@@ -21713,7 +21761,7 @@
           <p:cNvPr id="16" name="TextBox 15">
             <a:extLst>
               <a:ext uri="{FF2B5EF4-FFF2-40B4-BE49-F238E27FC236}">
-                <a16:creationId xmlns="" xmlns:a16="http://schemas.microsoft.com/office/drawing/2014/main" id="{34FEC4EB-6265-3C9A-194F-C9E41AAAC52C}"/>
+                <a16:creationId xmlns:a16="http://schemas.microsoft.com/office/drawing/2014/main" xmlns="" id="{34FEC4EB-6265-3C9A-194F-C9E41AAAC52C}"/>
               </a:ext>
             </a:extLst>
           </p:cNvPr>
@@ -21759,7 +21807,7 @@
           <p:cNvPr id="17" name="TextBox 16">
             <a:extLst>
               <a:ext uri="{FF2B5EF4-FFF2-40B4-BE49-F238E27FC236}">
-                <a16:creationId xmlns="" xmlns:a16="http://schemas.microsoft.com/office/drawing/2014/main" id="{21C37205-2E9B-A3D7-453C-BA1143389C47}"/>
+                <a16:creationId xmlns:a16="http://schemas.microsoft.com/office/drawing/2014/main" xmlns="" id="{21C37205-2E9B-A3D7-453C-BA1143389C47}"/>
               </a:ext>
             </a:extLst>
           </p:cNvPr>
@@ -21798,7 +21846,7 @@
           <p:cNvPr id="18" name="TextBox 17">
             <a:extLst>
               <a:ext uri="{FF2B5EF4-FFF2-40B4-BE49-F238E27FC236}">
-                <a16:creationId xmlns="" xmlns:a16="http://schemas.microsoft.com/office/drawing/2014/main" id="{C11EB94A-7599-12BE-A015-138DF82E7D88}"/>
+                <a16:creationId xmlns:a16="http://schemas.microsoft.com/office/drawing/2014/main" xmlns="" id="{C11EB94A-7599-12BE-A015-138DF82E7D88}"/>
               </a:ext>
             </a:extLst>
           </p:cNvPr>
@@ -21840,7 +21888,7 @@
           <p:cNvPr id="9" name="Picture 8">
             <a:extLst>
               <a:ext uri="{FF2B5EF4-FFF2-40B4-BE49-F238E27FC236}">
-                <a16:creationId xmlns="" xmlns:a16="http://schemas.microsoft.com/office/drawing/2014/main" id="{F3934AA7-7FA1-4AF5-11DF-34C8209BBBC5}"/>
+                <a16:creationId xmlns:a16="http://schemas.microsoft.com/office/drawing/2014/main" xmlns="" id="{F3934AA7-7FA1-4AF5-11DF-34C8209BBBC5}"/>
               </a:ext>
             </a:extLst>
           </p:cNvPr>
@@ -22338,7 +22386,7 @@
           <p:cNvPr id="4" name="Title 1">
             <a:extLst>
               <a:ext uri="{FF2B5EF4-FFF2-40B4-BE49-F238E27FC236}">
-                <a16:creationId xmlns="" xmlns:a16="http://schemas.microsoft.com/office/drawing/2014/main" id="{0A4045B0-C940-93C6-79DB-351A147113E4}"/>
+                <a16:creationId xmlns:a16="http://schemas.microsoft.com/office/drawing/2014/main" xmlns="" id="{0A4045B0-C940-93C6-79DB-351A147113E4}"/>
               </a:ext>
             </a:extLst>
           </p:cNvPr>
@@ -22371,7 +22419,7 @@
           <p:cNvPr id="5" name="TextBox 4">
             <a:extLst>
               <a:ext uri="{FF2B5EF4-FFF2-40B4-BE49-F238E27FC236}">
-                <a16:creationId xmlns="" xmlns:a16="http://schemas.microsoft.com/office/drawing/2014/main" id="{AAC62DE3-37FA-81ED-2B19-6155C5C4FB6A}"/>
+                <a16:creationId xmlns:a16="http://schemas.microsoft.com/office/drawing/2014/main" xmlns="" id="{AAC62DE3-37FA-81ED-2B19-6155C5C4FB6A}"/>
               </a:ext>
             </a:extLst>
           </p:cNvPr>
@@ -22735,7 +22783,7 @@
           <p:cNvPr id="9" name="Picture 8">
             <a:extLst>
               <a:ext uri="{FF2B5EF4-FFF2-40B4-BE49-F238E27FC236}">
-                <a16:creationId xmlns="" xmlns:a16="http://schemas.microsoft.com/office/drawing/2014/main" id="{DC69AF7A-D5F6-AF94-6226-64A1B3D13F3D}"/>
+                <a16:creationId xmlns:a16="http://schemas.microsoft.com/office/drawing/2014/main" xmlns="" id="{DC69AF7A-D5F6-AF94-6226-64A1B3D13F3D}"/>
               </a:ext>
             </a:extLst>
           </p:cNvPr>
@@ -22927,7 +22975,7 @@
           <p:cNvPr id="4" name="Title 1">
             <a:extLst>
               <a:ext uri="{FF2B5EF4-FFF2-40B4-BE49-F238E27FC236}">
-                <a16:creationId xmlns="" xmlns:a16="http://schemas.microsoft.com/office/drawing/2014/main" id="{0A4045B0-C940-93C6-79DB-351A147113E4}"/>
+                <a16:creationId xmlns:a16="http://schemas.microsoft.com/office/drawing/2014/main" xmlns="" id="{0A4045B0-C940-93C6-79DB-351A147113E4}"/>
               </a:ext>
             </a:extLst>
           </p:cNvPr>
@@ -22960,7 +23008,7 @@
           <p:cNvPr id="5" name="TextBox 4">
             <a:extLst>
               <a:ext uri="{FF2B5EF4-FFF2-40B4-BE49-F238E27FC236}">
-                <a16:creationId xmlns="" xmlns:a16="http://schemas.microsoft.com/office/drawing/2014/main" id="{AAC62DE3-37FA-81ED-2B19-6155C5C4FB6A}"/>
+                <a16:creationId xmlns:a16="http://schemas.microsoft.com/office/drawing/2014/main" xmlns="" id="{AAC62DE3-37FA-81ED-2B19-6155C5C4FB6A}"/>
               </a:ext>
             </a:extLst>
           </p:cNvPr>
@@ -23242,7 +23290,7 @@
           <p:cNvPr id="3" name="Picture 2">
             <a:extLst>
               <a:ext uri="{FF2B5EF4-FFF2-40B4-BE49-F238E27FC236}">
-                <a16:creationId xmlns="" xmlns:a16="http://schemas.microsoft.com/office/drawing/2014/main" id="{26D9E3AC-C35C-EBF0-20C7-EAD5FC9B88C7}"/>
+                <a16:creationId xmlns:a16="http://schemas.microsoft.com/office/drawing/2014/main" xmlns="" id="{26D9E3AC-C35C-EBF0-20C7-EAD5FC9B88C7}"/>
               </a:ext>
             </a:extLst>
           </p:cNvPr>
@@ -23434,7 +23482,7 @@
           <p:cNvPr id="4" name="Title 1">
             <a:extLst>
               <a:ext uri="{FF2B5EF4-FFF2-40B4-BE49-F238E27FC236}">
-                <a16:creationId xmlns="" xmlns:a16="http://schemas.microsoft.com/office/drawing/2014/main" id="{0A4045B0-C940-93C6-79DB-351A147113E4}"/>
+                <a16:creationId xmlns:a16="http://schemas.microsoft.com/office/drawing/2014/main" xmlns="" id="{0A4045B0-C940-93C6-79DB-351A147113E4}"/>
               </a:ext>
             </a:extLst>
           </p:cNvPr>
@@ -23471,7 +23519,7 @@
           <p:cNvPr id="5" name="TextBox 4">
             <a:extLst>
               <a:ext uri="{FF2B5EF4-FFF2-40B4-BE49-F238E27FC236}">
-                <a16:creationId xmlns="" xmlns:a16="http://schemas.microsoft.com/office/drawing/2014/main" id="{AAC62DE3-37FA-81ED-2B19-6155C5C4FB6A}"/>
+                <a16:creationId xmlns:a16="http://schemas.microsoft.com/office/drawing/2014/main" xmlns="" id="{AAC62DE3-37FA-81ED-2B19-6155C5C4FB6A}"/>
               </a:ext>
             </a:extLst>
           </p:cNvPr>
@@ -23734,7 +23782,7 @@
           <p:cNvPr id="6" name="Picture 5">
             <a:extLst>
               <a:ext uri="{FF2B5EF4-FFF2-40B4-BE49-F238E27FC236}">
-                <a16:creationId xmlns="" xmlns:a16="http://schemas.microsoft.com/office/drawing/2014/main" id="{7C88032A-86F2-5985-C0A4-6E39C9F51CC6}"/>
+                <a16:creationId xmlns:a16="http://schemas.microsoft.com/office/drawing/2014/main" xmlns="" id="{7C88032A-86F2-5985-C0A4-6E39C9F51CC6}"/>
               </a:ext>
             </a:extLst>
           </p:cNvPr>
@@ -23770,7 +23818,7 @@
           <p:cNvPr id="7" name="TextBox 6">
             <a:extLst>
               <a:ext uri="{FF2B5EF4-FFF2-40B4-BE49-F238E27FC236}">
-                <a16:creationId xmlns="" xmlns:a16="http://schemas.microsoft.com/office/drawing/2014/main" id="{1F77591A-DB2F-9F91-4945-B2EC29845B38}"/>
+                <a16:creationId xmlns:a16="http://schemas.microsoft.com/office/drawing/2014/main" xmlns="" id="{1F77591A-DB2F-9F91-4945-B2EC29845B38}"/>
               </a:ext>
             </a:extLst>
           </p:cNvPr>
@@ -24132,7 +24180,7 @@
           <p:cNvPr id="4" name="Title 1">
             <a:extLst>
               <a:ext uri="{FF2B5EF4-FFF2-40B4-BE49-F238E27FC236}">
-                <a16:creationId xmlns="" xmlns:a16="http://schemas.microsoft.com/office/drawing/2014/main" id="{0A4045B0-C940-93C6-79DB-351A147113E4}"/>
+                <a16:creationId xmlns:a16="http://schemas.microsoft.com/office/drawing/2014/main" xmlns="" id="{0A4045B0-C940-93C6-79DB-351A147113E4}"/>
               </a:ext>
             </a:extLst>
           </p:cNvPr>
@@ -24165,7 +24213,7 @@
           <p:cNvPr id="7" name="TextBox 6">
             <a:extLst>
               <a:ext uri="{FF2B5EF4-FFF2-40B4-BE49-F238E27FC236}">
-                <a16:creationId xmlns="" xmlns:a16="http://schemas.microsoft.com/office/drawing/2014/main" id="{1F77591A-DB2F-9F91-4945-B2EC29845B38}"/>
+                <a16:creationId xmlns:a16="http://schemas.microsoft.com/office/drawing/2014/main" xmlns="" id="{1F77591A-DB2F-9F91-4945-B2EC29845B38}"/>
               </a:ext>
             </a:extLst>
           </p:cNvPr>
@@ -24281,7 +24329,7 @@
           <p:cNvPr id="8" name="Picture 7">
             <a:extLst>
               <a:ext uri="{FF2B5EF4-FFF2-40B4-BE49-F238E27FC236}">
-                <a16:creationId xmlns="" xmlns:a16="http://schemas.microsoft.com/office/drawing/2014/main" id="{B643EA6D-4B4D-8F4A-AF04-E12FB151ED2B}"/>
+                <a16:creationId xmlns:a16="http://schemas.microsoft.com/office/drawing/2014/main" xmlns="" id="{B643EA6D-4B4D-8F4A-AF04-E12FB151ED2B}"/>
               </a:ext>
             </a:extLst>
           </p:cNvPr>
@@ -24311,7 +24359,7 @@
           <p:cNvPr id="9" name="TextBox 8">
             <a:extLst>
               <a:ext uri="{FF2B5EF4-FFF2-40B4-BE49-F238E27FC236}">
-                <a16:creationId xmlns="" xmlns:a16="http://schemas.microsoft.com/office/drawing/2014/main" id="{4CEDAA70-1CF5-7892-405B-9D24EFE25BE8}"/>
+                <a16:creationId xmlns:a16="http://schemas.microsoft.com/office/drawing/2014/main" xmlns="" id="{4CEDAA70-1CF5-7892-405B-9D24EFE25BE8}"/>
               </a:ext>
             </a:extLst>
           </p:cNvPr>

</xml_diff>